<commit_message>
Refactoring for Maps and Ephemeris
Refactored make_patch and plot_patch to work for input maps of arbitrary size ([nx360,nx180,<1>]. So it works for my SCT and VLT data as well as HST OPAL maps, both grey-scale and RGB. I also incorporated PlanetMapper spice computations for ephemeris information (CM1, CM2, CM3) and that replaces get_WINJupos_ephem with get_spice_ephem. This also eliminates a 1-second wait everytime ephemeris needs to be generated.
</commit_message>
<xml_diff>
--- a/Maps/Map Calling Trees.pptx
+++ b/Maps/Map Calling Trees.pptx
@@ -247,7 +247,7 @@
           <a:p>
             <a:fld id="{4728A198-E1B1-4E07-BA63-B848E5929EE6}" type="datetimeFigureOut">
               <a:rPr lang="en-US" smtClean="0"/>
-              <a:t>5/24/2025</a:t>
+              <a:t>8/13/2025</a:t>
             </a:fld>
             <a:endParaRPr lang="en-US"/>
           </a:p>
@@ -417,7 +417,7 @@
           <a:p>
             <a:fld id="{4728A198-E1B1-4E07-BA63-B848E5929EE6}" type="datetimeFigureOut">
               <a:rPr lang="en-US" smtClean="0"/>
-              <a:t>5/24/2025</a:t>
+              <a:t>8/13/2025</a:t>
             </a:fld>
             <a:endParaRPr lang="en-US"/>
           </a:p>
@@ -597,7 +597,7 @@
           <a:p>
             <a:fld id="{4728A198-E1B1-4E07-BA63-B848E5929EE6}" type="datetimeFigureOut">
               <a:rPr lang="en-US" smtClean="0"/>
-              <a:t>5/24/2025</a:t>
+              <a:t>8/13/2025</a:t>
             </a:fld>
             <a:endParaRPr lang="en-US"/>
           </a:p>
@@ -767,7 +767,7 @@
           <a:p>
             <a:fld id="{4728A198-E1B1-4E07-BA63-B848E5929EE6}" type="datetimeFigureOut">
               <a:rPr lang="en-US" smtClean="0"/>
-              <a:t>5/24/2025</a:t>
+              <a:t>8/13/2025</a:t>
             </a:fld>
             <a:endParaRPr lang="en-US"/>
           </a:p>
@@ -1011,7 +1011,7 @@
           <a:p>
             <a:fld id="{4728A198-E1B1-4E07-BA63-B848E5929EE6}" type="datetimeFigureOut">
               <a:rPr lang="en-US" smtClean="0"/>
-              <a:t>5/24/2025</a:t>
+              <a:t>8/13/2025</a:t>
             </a:fld>
             <a:endParaRPr lang="en-US"/>
           </a:p>
@@ -1243,7 +1243,7 @@
           <a:p>
             <a:fld id="{4728A198-E1B1-4E07-BA63-B848E5929EE6}" type="datetimeFigureOut">
               <a:rPr lang="en-US" smtClean="0"/>
-              <a:t>5/24/2025</a:t>
+              <a:t>8/13/2025</a:t>
             </a:fld>
             <a:endParaRPr lang="en-US"/>
           </a:p>
@@ -1610,7 +1610,7 @@
           <a:p>
             <a:fld id="{4728A198-E1B1-4E07-BA63-B848E5929EE6}" type="datetimeFigureOut">
               <a:rPr lang="en-US" smtClean="0"/>
-              <a:t>5/24/2025</a:t>
+              <a:t>8/13/2025</a:t>
             </a:fld>
             <a:endParaRPr lang="en-US"/>
           </a:p>
@@ -1728,7 +1728,7 @@
           <a:p>
             <a:fld id="{4728A198-E1B1-4E07-BA63-B848E5929EE6}" type="datetimeFigureOut">
               <a:rPr lang="en-US" smtClean="0"/>
-              <a:t>5/24/2025</a:t>
+              <a:t>8/13/2025</a:t>
             </a:fld>
             <a:endParaRPr lang="en-US"/>
           </a:p>
@@ -1823,7 +1823,7 @@
           <a:p>
             <a:fld id="{4728A198-E1B1-4E07-BA63-B848E5929EE6}" type="datetimeFigureOut">
               <a:rPr lang="en-US" smtClean="0"/>
-              <a:t>5/24/2025</a:t>
+              <a:t>8/13/2025</a:t>
             </a:fld>
             <a:endParaRPr lang="en-US"/>
           </a:p>
@@ -2100,7 +2100,7 @@
           <a:p>
             <a:fld id="{4728A198-E1B1-4E07-BA63-B848E5929EE6}" type="datetimeFigureOut">
               <a:rPr lang="en-US" smtClean="0"/>
-              <a:t>5/24/2025</a:t>
+              <a:t>8/13/2025</a:t>
             </a:fld>
             <a:endParaRPr lang="en-US"/>
           </a:p>
@@ -2357,7 +2357,7 @@
           <a:p>
             <a:fld id="{4728A198-E1B1-4E07-BA63-B848E5929EE6}" type="datetimeFigureOut">
               <a:rPr lang="en-US" smtClean="0"/>
-              <a:t>5/24/2025</a:t>
+              <a:t>8/13/2025</a:t>
             </a:fld>
             <a:endParaRPr lang="en-US"/>
           </a:p>
@@ -2570,7 +2570,7 @@
           <a:p>
             <a:fld id="{4728A198-E1B1-4E07-BA63-B848E5929EE6}" type="datetimeFigureOut">
               <a:rPr lang="en-US" smtClean="0"/>
-              <a:t>5/24/2025</a:t>
+              <a:t>8/13/2025</a:t>
             </a:fld>
             <a:endParaRPr lang="en-US"/>
           </a:p>
@@ -3087,7 +3087,7 @@
         </p:nvSpPr>
         <p:spPr>
           <a:xfrm>
-            <a:off x="2184403" y="2185486"/>
+            <a:off x="3459789" y="2185486"/>
             <a:ext cx="730288" cy="336884"/>
           </a:xfrm>
           <a:prstGeom prst="roundRect">
@@ -3117,55 +3117,6 @@
             <a:r>
               <a:rPr lang="en-US" sz="1200" dirty="0" err="1"/>
               <a:t>plot_patch</a:t>
-            </a:r>
-            <a:endParaRPr lang="en-US" sz="1200" dirty="0"/>
-          </a:p>
-        </p:txBody>
-      </p:sp>
-      <p:sp>
-        <p:nvSpPr>
-          <p:cNvPr id="5" name="Rectangle: Rounded Corners 4">
-            <a:extLst>
-              <a:ext uri="{FF2B5EF4-FFF2-40B4-BE49-F238E27FC236}">
-                <a16:creationId xmlns:a16="http://schemas.microsoft.com/office/drawing/2014/main" id="{EB0B7BBB-72F9-F38F-50D6-B8889C7D8236}"/>
-              </a:ext>
-            </a:extLst>
-          </p:cNvPr>
-          <p:cNvSpPr/>
-          <p:nvPr/>
-        </p:nvSpPr>
-        <p:spPr>
-          <a:xfrm>
-            <a:off x="2958046" y="2177649"/>
-            <a:ext cx="1200530" cy="336884"/>
-          </a:xfrm>
-          <a:prstGeom prst="roundRect">
-            <a:avLst/>
-          </a:prstGeom>
-          <a:ln w="28575"/>
-        </p:spPr>
-        <p:style>
-          <a:lnRef idx="2">
-            <a:schemeClr val="dk1"/>
-          </a:lnRef>
-          <a:fillRef idx="1">
-            <a:schemeClr val="lt1"/>
-          </a:fillRef>
-          <a:effectRef idx="0">
-            <a:schemeClr val="dk1"/>
-          </a:effectRef>
-          <a:fontRef idx="minor">
-            <a:schemeClr val="dk1"/>
-          </a:fontRef>
-        </p:style>
-        <p:txBody>
-          <a:bodyPr lIns="0" tIns="0" rIns="0" bIns="0" rtlCol="0" anchor="ctr"/>
-          <a:lstStyle/>
-          <a:p>
-            <a:pPr algn="ctr"/>
-            <a:r>
-              <a:rPr lang="en-US" sz="1200" dirty="0" err="1"/>
-              <a:t>make_patch_RGB</a:t>
             </a:r>
             <a:endParaRPr lang="en-US" sz="1200" dirty="0"/>
           </a:p>
@@ -3185,7 +3136,7 @@
         </p:nvSpPr>
         <p:spPr>
           <a:xfrm>
-            <a:off x="1289428" y="2185486"/>
+            <a:off x="2564814" y="2185486"/>
             <a:ext cx="821354" cy="336884"/>
           </a:xfrm>
           <a:prstGeom prst="roundRect">
@@ -3269,49 +3220,6 @@
           </a:p>
         </p:txBody>
       </p:sp>
-      <p:cxnSp>
-        <p:nvCxnSpPr>
-          <p:cNvPr id="14" name="Connector: Elbow 13">
-            <a:extLst>
-              <a:ext uri="{FF2B5EF4-FFF2-40B4-BE49-F238E27FC236}">
-                <a16:creationId xmlns:a16="http://schemas.microsoft.com/office/drawing/2014/main" id="{E8A04B15-079C-059E-34F0-84735803E7D3}"/>
-              </a:ext>
-            </a:extLst>
-          </p:cNvPr>
-          <p:cNvCxnSpPr>
-            <a:cxnSpLocks/>
-            <a:stCxn id="3" idx="2"/>
-            <a:endCxn id="5" idx="0"/>
-          </p:cNvCxnSpPr>
-          <p:nvPr/>
-        </p:nvCxnSpPr>
-        <p:spPr>
-          <a:xfrm rot="16200000" flipH="1">
-            <a:off x="3283742" y="1903080"/>
-            <a:ext cx="419826" cy="129311"/>
-          </a:xfrm>
-          <a:prstGeom prst="bentConnector3">
-            <a:avLst>
-              <a:gd name="adj1" fmla="val 50000"/>
-            </a:avLst>
-          </a:prstGeom>
-          <a:ln w="28575"/>
-        </p:spPr>
-        <p:style>
-          <a:lnRef idx="3">
-            <a:schemeClr val="dk1"/>
-          </a:lnRef>
-          <a:fillRef idx="0">
-            <a:schemeClr val="dk1"/>
-          </a:fillRef>
-          <a:effectRef idx="2">
-            <a:schemeClr val="dk1"/>
-          </a:effectRef>
-          <a:fontRef idx="minor">
-            <a:schemeClr val="tx1"/>
-          </a:fontRef>
-        </p:style>
-      </p:cxnSp>
       <p:cxnSp>
         <p:nvCxnSpPr>
           <p:cNvPr id="15" name="Connector: Elbow 14">
@@ -3329,9 +3237,9 @@
           <p:nvPr/>
         </p:nvCxnSpPr>
         <p:spPr>
-          <a:xfrm rot="5400000">
-            <a:off x="2775443" y="1531928"/>
-            <a:ext cx="427663" cy="879453"/>
+          <a:xfrm rot="16200000" flipH="1">
+            <a:off x="3413135" y="1773687"/>
+            <a:ext cx="427663" cy="395933"/>
           </a:xfrm>
           <a:prstGeom prst="bentConnector3">
             <a:avLst/>
@@ -3367,7 +3275,7 @@
         </p:nvSpPr>
         <p:spPr>
           <a:xfrm>
-            <a:off x="-211014" y="2185486"/>
+            <a:off x="1064372" y="2185486"/>
             <a:ext cx="1435004" cy="336884"/>
           </a:xfrm>
           <a:prstGeom prst="roundRect">
@@ -3415,7 +3323,7 @@
         </p:nvSpPr>
         <p:spPr>
           <a:xfrm>
-            <a:off x="-1624580" y="2169070"/>
+            <a:off x="-349194" y="2169070"/>
             <a:ext cx="1356980" cy="336884"/>
           </a:xfrm>
           <a:prstGeom prst="roundRect">
@@ -3601,8 +3509,8 @@
         </p:nvCxnSpPr>
         <p:spPr>
           <a:xfrm rot="5400000">
-            <a:off x="1035832" y="-224099"/>
-            <a:ext cx="411247" cy="4375090"/>
+            <a:off x="1673525" y="413594"/>
+            <a:ext cx="411247" cy="3099704"/>
           </a:xfrm>
           <a:prstGeom prst="bentConnector3">
             <a:avLst>
@@ -3644,8 +3552,8 @@
         </p:nvCxnSpPr>
         <p:spPr>
           <a:xfrm rot="5400000">
-            <a:off x="1753913" y="510398"/>
-            <a:ext cx="427663" cy="2922512"/>
+            <a:off x="2391606" y="1148091"/>
+            <a:ext cx="427663" cy="1647126"/>
           </a:xfrm>
           <a:prstGeom prst="bentConnector3">
             <a:avLst>
@@ -3687,8 +3595,8 @@
         </p:nvCxnSpPr>
         <p:spPr>
           <a:xfrm rot="5400000">
-            <a:off x="2350722" y="1107207"/>
-            <a:ext cx="427663" cy="1728895"/>
+            <a:off x="2988415" y="1744900"/>
+            <a:ext cx="427663" cy="453509"/>
           </a:xfrm>
           <a:prstGeom prst="bentConnector3">
             <a:avLst>

</xml_diff>

<commit_message>
Pre-AGU update for 2025
Contains all changes to code used to support the 2025 AGU poster along with new 5 micron data from Glenn
</commit_message>
<xml_diff>
--- a/Maps/Map Calling Trees.pptx
+++ b/Maps/Map Calling Trees.pptx
@@ -2,16 +2,17 @@
 <file path=ppt/presentation.xml><?xml version="1.0" encoding="utf-8"?>
 <p:presentation xmlns:a="http://schemas.openxmlformats.org/drawingml/2006/main" xmlns:r="http://schemas.openxmlformats.org/officeDocument/2006/relationships" xmlns:p="http://schemas.openxmlformats.org/presentationml/2006/main" saveSubsetFonts="1">
   <p:sldMasterIdLst>
-    <p:sldMasterId id="2147483684" r:id="rId1"/>
+    <p:sldMasterId id="2147483696" r:id="rId1"/>
   </p:sldMasterIdLst>
   <p:sldIdLst>
-    <p:sldId id="257" r:id="rId2"/>
-    <p:sldId id="258" r:id="rId3"/>
-    <p:sldId id="259" r:id="rId4"/>
-    <p:sldId id="260" r:id="rId5"/>
-    <p:sldId id="262" r:id="rId6"/>
+    <p:sldId id="263" r:id="rId2"/>
+    <p:sldId id="257" r:id="rId3"/>
+    <p:sldId id="258" r:id="rId4"/>
+    <p:sldId id="259" r:id="rId5"/>
+    <p:sldId id="260" r:id="rId6"/>
+    <p:sldId id="262" r:id="rId7"/>
   </p:sldIdLst>
-  <p:sldSz cx="6858000" cy="9144000" type="screen4x3"/>
+  <p:sldSz cx="16256000" cy="9144000"/>
   <p:notesSz cx="6858000" cy="9144000"/>
   <p:defaultTextStyle>
     <a:defPPr>
@@ -145,15 +146,15 @@
         </p:nvSpPr>
         <p:spPr>
           <a:xfrm>
-            <a:off x="514350" y="1496484"/>
-            <a:ext cx="5829300" cy="3183467"/>
+            <a:off x="2032000" y="1496484"/>
+            <a:ext cx="12192000" cy="3183467"/>
           </a:xfrm>
         </p:spPr>
         <p:txBody>
           <a:bodyPr anchor="b"/>
           <a:lstStyle>
             <a:lvl1pPr algn="ctr">
-              <a:defRPr sz="4500"/>
+              <a:defRPr sz="8000"/>
             </a:lvl1pPr>
           </a:lstStyle>
           <a:p>
@@ -177,8 +178,8 @@
         </p:nvSpPr>
         <p:spPr>
           <a:xfrm>
-            <a:off x="857250" y="4802717"/>
-            <a:ext cx="5143500" cy="2207683"/>
+            <a:off x="2032000" y="4802717"/>
+            <a:ext cx="12192000" cy="2207683"/>
           </a:xfrm>
         </p:spPr>
         <p:txBody>
@@ -186,39 +187,39 @@
           <a:lstStyle>
             <a:lvl1pPr marL="0" indent="0" algn="ctr">
               <a:buNone/>
-              <a:defRPr sz="1800"/>
+              <a:defRPr sz="3200"/>
             </a:lvl1pPr>
-            <a:lvl2pPr marL="342900" indent="0" algn="ctr">
-              <a:buNone/>
-              <a:defRPr sz="1500"/>
+            <a:lvl2pPr marL="609585" indent="0" algn="ctr">
+              <a:buNone/>
+              <a:defRPr sz="2667"/>
             </a:lvl2pPr>
-            <a:lvl3pPr marL="685800" indent="0" algn="ctr">
-              <a:buNone/>
-              <a:defRPr sz="1350"/>
+            <a:lvl3pPr marL="1219170" indent="0" algn="ctr">
+              <a:buNone/>
+              <a:defRPr sz="2400"/>
             </a:lvl3pPr>
-            <a:lvl4pPr marL="1028700" indent="0" algn="ctr">
-              <a:buNone/>
-              <a:defRPr sz="1200"/>
+            <a:lvl4pPr marL="1828754" indent="0" algn="ctr">
+              <a:buNone/>
+              <a:defRPr sz="2133"/>
             </a:lvl4pPr>
-            <a:lvl5pPr marL="1371600" indent="0" algn="ctr">
-              <a:buNone/>
-              <a:defRPr sz="1200"/>
+            <a:lvl5pPr marL="2438339" indent="0" algn="ctr">
+              <a:buNone/>
+              <a:defRPr sz="2133"/>
             </a:lvl5pPr>
-            <a:lvl6pPr marL="1714500" indent="0" algn="ctr">
-              <a:buNone/>
-              <a:defRPr sz="1200"/>
+            <a:lvl6pPr marL="3047924" indent="0" algn="ctr">
+              <a:buNone/>
+              <a:defRPr sz="2133"/>
             </a:lvl6pPr>
-            <a:lvl7pPr marL="2057400" indent="0" algn="ctr">
-              <a:buNone/>
-              <a:defRPr sz="1200"/>
+            <a:lvl7pPr marL="3657509" indent="0" algn="ctr">
+              <a:buNone/>
+              <a:defRPr sz="2133"/>
             </a:lvl7pPr>
-            <a:lvl8pPr marL="2400300" indent="0" algn="ctr">
-              <a:buNone/>
-              <a:defRPr sz="1200"/>
+            <a:lvl8pPr marL="4267093" indent="0" algn="ctr">
+              <a:buNone/>
+              <a:defRPr sz="2133"/>
             </a:lvl8pPr>
-            <a:lvl9pPr marL="2743200" indent="0" algn="ctr">
-              <a:buNone/>
-              <a:defRPr sz="1200"/>
+            <a:lvl9pPr marL="4876678" indent="0" algn="ctr">
+              <a:buNone/>
+              <a:defRPr sz="2133"/>
             </a:lvl9pPr>
           </a:lstStyle>
           <a:p>
@@ -247,7 +248,7 @@
           <a:p>
             <a:fld id="{4728A198-E1B1-4E07-BA63-B848E5929EE6}" type="datetimeFigureOut">
               <a:rPr lang="en-US" smtClean="0"/>
-              <a:t>8/13/2025</a:t>
+              <a:t>11/20/2025</a:t>
             </a:fld>
             <a:endParaRPr lang="en-US"/>
           </a:p>
@@ -298,7 +299,7 @@
     </p:spTree>
     <p:extLst>
       <p:ext uri="{BB962C8B-B14F-4D97-AF65-F5344CB8AC3E}">
-        <p14:creationId xmlns:p14="http://schemas.microsoft.com/office/powerpoint/2010/main" val="3502949204"/>
+        <p14:creationId xmlns:p14="http://schemas.microsoft.com/office/powerpoint/2010/main" val="1112871618"/>
       </p:ext>
     </p:extLst>
   </p:cSld>
@@ -417,7 +418,7 @@
           <a:p>
             <a:fld id="{4728A198-E1B1-4E07-BA63-B848E5929EE6}" type="datetimeFigureOut">
               <a:rPr lang="en-US" smtClean="0"/>
-              <a:t>8/13/2025</a:t>
+              <a:t>11/20/2025</a:t>
             </a:fld>
             <a:endParaRPr lang="en-US"/>
           </a:p>
@@ -468,7 +469,7 @@
     </p:spTree>
     <p:extLst>
       <p:ext uri="{BB962C8B-B14F-4D97-AF65-F5344CB8AC3E}">
-        <p14:creationId xmlns:p14="http://schemas.microsoft.com/office/powerpoint/2010/main" val="1602436058"/>
+        <p14:creationId xmlns:p14="http://schemas.microsoft.com/office/powerpoint/2010/main" val="2969026452"/>
       </p:ext>
     </p:extLst>
   </p:cSld>
@@ -507,8 +508,8 @@
         </p:nvSpPr>
         <p:spPr>
           <a:xfrm>
-            <a:off x="4907757" y="486834"/>
-            <a:ext cx="1478756" cy="7749117"/>
+            <a:off x="11633200" y="486834"/>
+            <a:ext cx="3505200" cy="7749117"/>
           </a:xfrm>
         </p:spPr>
         <p:txBody>
@@ -535,8 +536,8 @@
         </p:nvSpPr>
         <p:spPr>
           <a:xfrm>
-            <a:off x="471488" y="486834"/>
-            <a:ext cx="4350544" cy="7749117"/>
+            <a:off x="1117600" y="486834"/>
+            <a:ext cx="10312400" cy="7749117"/>
           </a:xfrm>
         </p:spPr>
         <p:txBody>
@@ -597,7 +598,7 @@
           <a:p>
             <a:fld id="{4728A198-E1B1-4E07-BA63-B848E5929EE6}" type="datetimeFigureOut">
               <a:rPr lang="en-US" smtClean="0"/>
-              <a:t>8/13/2025</a:t>
+              <a:t>11/20/2025</a:t>
             </a:fld>
             <a:endParaRPr lang="en-US"/>
           </a:p>
@@ -648,7 +649,7 @@
     </p:spTree>
     <p:extLst>
       <p:ext uri="{BB962C8B-B14F-4D97-AF65-F5344CB8AC3E}">
-        <p14:creationId xmlns:p14="http://schemas.microsoft.com/office/powerpoint/2010/main" val="2821345087"/>
+        <p14:creationId xmlns:p14="http://schemas.microsoft.com/office/powerpoint/2010/main" val="2931857401"/>
       </p:ext>
     </p:extLst>
   </p:cSld>
@@ -767,7 +768,7 @@
           <a:p>
             <a:fld id="{4728A198-E1B1-4E07-BA63-B848E5929EE6}" type="datetimeFigureOut">
               <a:rPr lang="en-US" smtClean="0"/>
-              <a:t>8/13/2025</a:t>
+              <a:t>11/20/2025</a:t>
             </a:fld>
             <a:endParaRPr lang="en-US"/>
           </a:p>
@@ -818,7 +819,7 @@
     </p:spTree>
     <p:extLst>
       <p:ext uri="{BB962C8B-B14F-4D97-AF65-F5344CB8AC3E}">
-        <p14:creationId xmlns:p14="http://schemas.microsoft.com/office/powerpoint/2010/main" val="1209424539"/>
+        <p14:creationId xmlns:p14="http://schemas.microsoft.com/office/powerpoint/2010/main" val="1004058399"/>
       </p:ext>
     </p:extLst>
   </p:cSld>
@@ -857,15 +858,15 @@
         </p:nvSpPr>
         <p:spPr>
           <a:xfrm>
-            <a:off x="467916" y="2279653"/>
-            <a:ext cx="5915025" cy="3803649"/>
+            <a:off x="1109133" y="2279652"/>
+            <a:ext cx="14020800" cy="3803649"/>
           </a:xfrm>
         </p:spPr>
         <p:txBody>
           <a:bodyPr anchor="b"/>
           <a:lstStyle>
             <a:lvl1pPr>
-              <a:defRPr sz="4500"/>
+              <a:defRPr sz="8000"/>
             </a:lvl1pPr>
           </a:lstStyle>
           <a:p>
@@ -889,8 +890,8 @@
         </p:nvSpPr>
         <p:spPr>
           <a:xfrm>
-            <a:off x="467916" y="6119286"/>
-            <a:ext cx="5915025" cy="2000249"/>
+            <a:off x="1109133" y="6119285"/>
+            <a:ext cx="14020800" cy="2000249"/>
           </a:xfrm>
         </p:spPr>
         <p:txBody>
@@ -898,15 +899,17 @@
           <a:lstStyle>
             <a:lvl1pPr marL="0" indent="0">
               <a:buNone/>
-              <a:defRPr sz="1800">
+              <a:defRPr sz="3200">
                 <a:solidFill>
-                  <a:schemeClr val="tx1"/>
+                  <a:schemeClr val="tx1">
+                    <a:tint val="75000"/>
+                  </a:schemeClr>
                 </a:solidFill>
               </a:defRPr>
             </a:lvl1pPr>
-            <a:lvl2pPr marL="342900" indent="0">
-              <a:buNone/>
-              <a:defRPr sz="1500">
+            <a:lvl2pPr marL="609585" indent="0">
+              <a:buNone/>
+              <a:defRPr sz="2667">
                 <a:solidFill>
                   <a:schemeClr val="tx1">
                     <a:tint val="75000"/>
@@ -914,9 +917,9 @@
                 </a:solidFill>
               </a:defRPr>
             </a:lvl2pPr>
-            <a:lvl3pPr marL="685800" indent="0">
-              <a:buNone/>
-              <a:defRPr sz="1350">
+            <a:lvl3pPr marL="1219170" indent="0">
+              <a:buNone/>
+              <a:defRPr sz="2400">
                 <a:solidFill>
                   <a:schemeClr val="tx1">
                     <a:tint val="75000"/>
@@ -924,9 +927,9 @@
                 </a:solidFill>
               </a:defRPr>
             </a:lvl3pPr>
-            <a:lvl4pPr marL="1028700" indent="0">
-              <a:buNone/>
-              <a:defRPr sz="1200">
+            <a:lvl4pPr marL="1828754" indent="0">
+              <a:buNone/>
+              <a:defRPr sz="2133">
                 <a:solidFill>
                   <a:schemeClr val="tx1">
                     <a:tint val="75000"/>
@@ -934,9 +937,9 @@
                 </a:solidFill>
               </a:defRPr>
             </a:lvl4pPr>
-            <a:lvl5pPr marL="1371600" indent="0">
-              <a:buNone/>
-              <a:defRPr sz="1200">
+            <a:lvl5pPr marL="2438339" indent="0">
+              <a:buNone/>
+              <a:defRPr sz="2133">
                 <a:solidFill>
                   <a:schemeClr val="tx1">
                     <a:tint val="75000"/>
@@ -944,9 +947,9 @@
                 </a:solidFill>
               </a:defRPr>
             </a:lvl5pPr>
-            <a:lvl6pPr marL="1714500" indent="0">
-              <a:buNone/>
-              <a:defRPr sz="1200">
+            <a:lvl6pPr marL="3047924" indent="0">
+              <a:buNone/>
+              <a:defRPr sz="2133">
                 <a:solidFill>
                   <a:schemeClr val="tx1">
                     <a:tint val="75000"/>
@@ -954,9 +957,9 @@
                 </a:solidFill>
               </a:defRPr>
             </a:lvl6pPr>
-            <a:lvl7pPr marL="2057400" indent="0">
-              <a:buNone/>
-              <a:defRPr sz="1200">
+            <a:lvl7pPr marL="3657509" indent="0">
+              <a:buNone/>
+              <a:defRPr sz="2133">
                 <a:solidFill>
                   <a:schemeClr val="tx1">
                     <a:tint val="75000"/>
@@ -964,9 +967,9 @@
                 </a:solidFill>
               </a:defRPr>
             </a:lvl7pPr>
-            <a:lvl8pPr marL="2400300" indent="0">
-              <a:buNone/>
-              <a:defRPr sz="1200">
+            <a:lvl8pPr marL="4267093" indent="0">
+              <a:buNone/>
+              <a:defRPr sz="2133">
                 <a:solidFill>
                   <a:schemeClr val="tx1">
                     <a:tint val="75000"/>
@@ -974,9 +977,9 @@
                 </a:solidFill>
               </a:defRPr>
             </a:lvl8pPr>
-            <a:lvl9pPr marL="2743200" indent="0">
-              <a:buNone/>
-              <a:defRPr sz="1200">
+            <a:lvl9pPr marL="4876678" indent="0">
+              <a:buNone/>
+              <a:defRPr sz="2133">
                 <a:solidFill>
                   <a:schemeClr val="tx1">
                     <a:tint val="75000"/>
@@ -1011,7 +1014,7 @@
           <a:p>
             <a:fld id="{4728A198-E1B1-4E07-BA63-B848E5929EE6}" type="datetimeFigureOut">
               <a:rPr lang="en-US" smtClean="0"/>
-              <a:t>8/13/2025</a:t>
+              <a:t>11/20/2025</a:t>
             </a:fld>
             <a:endParaRPr lang="en-US"/>
           </a:p>
@@ -1062,7 +1065,7 @@
     </p:spTree>
     <p:extLst>
       <p:ext uri="{BB962C8B-B14F-4D97-AF65-F5344CB8AC3E}">
-        <p14:creationId xmlns:p14="http://schemas.microsoft.com/office/powerpoint/2010/main" val="2437169295"/>
+        <p14:creationId xmlns:p14="http://schemas.microsoft.com/office/powerpoint/2010/main" val="1822989549"/>
       </p:ext>
     </p:extLst>
   </p:cSld>
@@ -1124,8 +1127,8 @@
         </p:nvSpPr>
         <p:spPr>
           <a:xfrm>
-            <a:off x="471488" y="2434167"/>
-            <a:ext cx="2914650" cy="5801784"/>
+            <a:off x="1117600" y="2434167"/>
+            <a:ext cx="6908800" cy="5801784"/>
           </a:xfrm>
         </p:spPr>
         <p:txBody>
@@ -1181,8 +1184,8 @@
         </p:nvSpPr>
         <p:spPr>
           <a:xfrm>
-            <a:off x="3471863" y="2434167"/>
-            <a:ext cx="2914650" cy="5801784"/>
+            <a:off x="8229600" y="2434167"/>
+            <a:ext cx="6908800" cy="5801784"/>
           </a:xfrm>
         </p:spPr>
         <p:txBody>
@@ -1243,7 +1246,7 @@
           <a:p>
             <a:fld id="{4728A198-E1B1-4E07-BA63-B848E5929EE6}" type="datetimeFigureOut">
               <a:rPr lang="en-US" smtClean="0"/>
-              <a:t>8/13/2025</a:t>
+              <a:t>11/20/2025</a:t>
             </a:fld>
             <a:endParaRPr lang="en-US"/>
           </a:p>
@@ -1294,7 +1297,7 @@
     </p:spTree>
     <p:extLst>
       <p:ext uri="{BB962C8B-B14F-4D97-AF65-F5344CB8AC3E}">
-        <p14:creationId xmlns:p14="http://schemas.microsoft.com/office/powerpoint/2010/main" val="528978223"/>
+        <p14:creationId xmlns:p14="http://schemas.microsoft.com/office/powerpoint/2010/main" val="4030648653"/>
       </p:ext>
     </p:extLst>
   </p:cSld>
@@ -1333,8 +1336,8 @@
         </p:nvSpPr>
         <p:spPr>
           <a:xfrm>
-            <a:off x="472381" y="486836"/>
-            <a:ext cx="5915025" cy="1767417"/>
+            <a:off x="1119717" y="486834"/>
+            <a:ext cx="14020800" cy="1767417"/>
           </a:xfrm>
         </p:spPr>
         <p:txBody>
@@ -1361,8 +1364,8 @@
         </p:nvSpPr>
         <p:spPr>
           <a:xfrm>
-            <a:off x="472381" y="2241551"/>
-            <a:ext cx="2901255" cy="1098549"/>
+            <a:off x="1119718" y="2241551"/>
+            <a:ext cx="6877049" cy="1098549"/>
           </a:xfrm>
         </p:spPr>
         <p:txBody>
@@ -1370,39 +1373,39 @@
           <a:lstStyle>
             <a:lvl1pPr marL="0" indent="0">
               <a:buNone/>
-              <a:defRPr sz="1800" b="1"/>
+              <a:defRPr sz="3200" b="1"/>
             </a:lvl1pPr>
-            <a:lvl2pPr marL="342900" indent="0">
-              <a:buNone/>
-              <a:defRPr sz="1500" b="1"/>
+            <a:lvl2pPr marL="609585" indent="0">
+              <a:buNone/>
+              <a:defRPr sz="2667" b="1"/>
             </a:lvl2pPr>
-            <a:lvl3pPr marL="685800" indent="0">
-              <a:buNone/>
-              <a:defRPr sz="1350" b="1"/>
+            <a:lvl3pPr marL="1219170" indent="0">
+              <a:buNone/>
+              <a:defRPr sz="2400" b="1"/>
             </a:lvl3pPr>
-            <a:lvl4pPr marL="1028700" indent="0">
-              <a:buNone/>
-              <a:defRPr sz="1200" b="1"/>
+            <a:lvl4pPr marL="1828754" indent="0">
+              <a:buNone/>
+              <a:defRPr sz="2133" b="1"/>
             </a:lvl4pPr>
-            <a:lvl5pPr marL="1371600" indent="0">
-              <a:buNone/>
-              <a:defRPr sz="1200" b="1"/>
+            <a:lvl5pPr marL="2438339" indent="0">
+              <a:buNone/>
+              <a:defRPr sz="2133" b="1"/>
             </a:lvl5pPr>
-            <a:lvl6pPr marL="1714500" indent="0">
-              <a:buNone/>
-              <a:defRPr sz="1200" b="1"/>
+            <a:lvl6pPr marL="3047924" indent="0">
+              <a:buNone/>
+              <a:defRPr sz="2133" b="1"/>
             </a:lvl6pPr>
-            <a:lvl7pPr marL="2057400" indent="0">
-              <a:buNone/>
-              <a:defRPr sz="1200" b="1"/>
+            <a:lvl7pPr marL="3657509" indent="0">
+              <a:buNone/>
+              <a:defRPr sz="2133" b="1"/>
             </a:lvl7pPr>
-            <a:lvl8pPr marL="2400300" indent="0">
-              <a:buNone/>
-              <a:defRPr sz="1200" b="1"/>
+            <a:lvl8pPr marL="4267093" indent="0">
+              <a:buNone/>
+              <a:defRPr sz="2133" b="1"/>
             </a:lvl8pPr>
-            <a:lvl9pPr marL="2743200" indent="0">
-              <a:buNone/>
-              <a:defRPr sz="1200" b="1"/>
+            <a:lvl9pPr marL="4876678" indent="0">
+              <a:buNone/>
+              <a:defRPr sz="2133" b="1"/>
             </a:lvl9pPr>
           </a:lstStyle>
           <a:p>
@@ -1426,8 +1429,8 @@
         </p:nvSpPr>
         <p:spPr>
           <a:xfrm>
-            <a:off x="472381" y="3340100"/>
-            <a:ext cx="2901255" cy="4912784"/>
+            <a:off x="1119718" y="3340100"/>
+            <a:ext cx="6877049" cy="4912784"/>
           </a:xfrm>
         </p:spPr>
         <p:txBody>
@@ -1483,8 +1486,8 @@
         </p:nvSpPr>
         <p:spPr>
           <a:xfrm>
-            <a:off x="3471863" y="2241551"/>
-            <a:ext cx="2915543" cy="1098549"/>
+            <a:off x="8229600" y="2241551"/>
+            <a:ext cx="6910917" cy="1098549"/>
           </a:xfrm>
         </p:spPr>
         <p:txBody>
@@ -1492,39 +1495,39 @@
           <a:lstStyle>
             <a:lvl1pPr marL="0" indent="0">
               <a:buNone/>
-              <a:defRPr sz="1800" b="1"/>
+              <a:defRPr sz="3200" b="1"/>
             </a:lvl1pPr>
-            <a:lvl2pPr marL="342900" indent="0">
-              <a:buNone/>
-              <a:defRPr sz="1500" b="1"/>
+            <a:lvl2pPr marL="609585" indent="0">
+              <a:buNone/>
+              <a:defRPr sz="2667" b="1"/>
             </a:lvl2pPr>
-            <a:lvl3pPr marL="685800" indent="0">
-              <a:buNone/>
-              <a:defRPr sz="1350" b="1"/>
+            <a:lvl3pPr marL="1219170" indent="0">
+              <a:buNone/>
+              <a:defRPr sz="2400" b="1"/>
             </a:lvl3pPr>
-            <a:lvl4pPr marL="1028700" indent="0">
-              <a:buNone/>
-              <a:defRPr sz="1200" b="1"/>
+            <a:lvl4pPr marL="1828754" indent="0">
+              <a:buNone/>
+              <a:defRPr sz="2133" b="1"/>
             </a:lvl4pPr>
-            <a:lvl5pPr marL="1371600" indent="0">
-              <a:buNone/>
-              <a:defRPr sz="1200" b="1"/>
+            <a:lvl5pPr marL="2438339" indent="0">
+              <a:buNone/>
+              <a:defRPr sz="2133" b="1"/>
             </a:lvl5pPr>
-            <a:lvl6pPr marL="1714500" indent="0">
-              <a:buNone/>
-              <a:defRPr sz="1200" b="1"/>
+            <a:lvl6pPr marL="3047924" indent="0">
+              <a:buNone/>
+              <a:defRPr sz="2133" b="1"/>
             </a:lvl6pPr>
-            <a:lvl7pPr marL="2057400" indent="0">
-              <a:buNone/>
-              <a:defRPr sz="1200" b="1"/>
+            <a:lvl7pPr marL="3657509" indent="0">
+              <a:buNone/>
+              <a:defRPr sz="2133" b="1"/>
             </a:lvl7pPr>
-            <a:lvl8pPr marL="2400300" indent="0">
-              <a:buNone/>
-              <a:defRPr sz="1200" b="1"/>
+            <a:lvl8pPr marL="4267093" indent="0">
+              <a:buNone/>
+              <a:defRPr sz="2133" b="1"/>
             </a:lvl8pPr>
-            <a:lvl9pPr marL="2743200" indent="0">
-              <a:buNone/>
-              <a:defRPr sz="1200" b="1"/>
+            <a:lvl9pPr marL="4876678" indent="0">
+              <a:buNone/>
+              <a:defRPr sz="2133" b="1"/>
             </a:lvl9pPr>
           </a:lstStyle>
           <a:p>
@@ -1548,8 +1551,8 @@
         </p:nvSpPr>
         <p:spPr>
           <a:xfrm>
-            <a:off x="3471863" y="3340100"/>
-            <a:ext cx="2915543" cy="4912784"/>
+            <a:off x="8229600" y="3340100"/>
+            <a:ext cx="6910917" cy="4912784"/>
           </a:xfrm>
         </p:spPr>
         <p:txBody>
@@ -1610,7 +1613,7 @@
           <a:p>
             <a:fld id="{4728A198-E1B1-4E07-BA63-B848E5929EE6}" type="datetimeFigureOut">
               <a:rPr lang="en-US" smtClean="0"/>
-              <a:t>8/13/2025</a:t>
+              <a:t>11/20/2025</a:t>
             </a:fld>
             <a:endParaRPr lang="en-US"/>
           </a:p>
@@ -1661,7 +1664,7 @@
     </p:spTree>
     <p:extLst>
       <p:ext uri="{BB962C8B-B14F-4D97-AF65-F5344CB8AC3E}">
-        <p14:creationId xmlns:p14="http://schemas.microsoft.com/office/powerpoint/2010/main" val="1539631178"/>
+        <p14:creationId xmlns:p14="http://schemas.microsoft.com/office/powerpoint/2010/main" val="3395081663"/>
       </p:ext>
     </p:extLst>
   </p:cSld>
@@ -1728,7 +1731,7 @@
           <a:p>
             <a:fld id="{4728A198-E1B1-4E07-BA63-B848E5929EE6}" type="datetimeFigureOut">
               <a:rPr lang="en-US" smtClean="0"/>
-              <a:t>8/13/2025</a:t>
+              <a:t>11/20/2025</a:t>
             </a:fld>
             <a:endParaRPr lang="en-US"/>
           </a:p>
@@ -1779,7 +1782,7 @@
     </p:spTree>
     <p:extLst>
       <p:ext uri="{BB962C8B-B14F-4D97-AF65-F5344CB8AC3E}">
-        <p14:creationId xmlns:p14="http://schemas.microsoft.com/office/powerpoint/2010/main" val="3298838086"/>
+        <p14:creationId xmlns:p14="http://schemas.microsoft.com/office/powerpoint/2010/main" val="1828460147"/>
       </p:ext>
     </p:extLst>
   </p:cSld>
@@ -1823,7 +1826,7 @@
           <a:p>
             <a:fld id="{4728A198-E1B1-4E07-BA63-B848E5929EE6}" type="datetimeFigureOut">
               <a:rPr lang="en-US" smtClean="0"/>
-              <a:t>8/13/2025</a:t>
+              <a:t>11/20/2025</a:t>
             </a:fld>
             <a:endParaRPr lang="en-US"/>
           </a:p>
@@ -1874,7 +1877,7 @@
     </p:spTree>
     <p:extLst>
       <p:ext uri="{BB962C8B-B14F-4D97-AF65-F5344CB8AC3E}">
-        <p14:creationId xmlns:p14="http://schemas.microsoft.com/office/powerpoint/2010/main" val="1194545047"/>
+        <p14:creationId xmlns:p14="http://schemas.microsoft.com/office/powerpoint/2010/main" val="2873188044"/>
       </p:ext>
     </p:extLst>
   </p:cSld>
@@ -1913,15 +1916,15 @@
         </p:nvSpPr>
         <p:spPr>
           <a:xfrm>
-            <a:off x="472381" y="609600"/>
-            <a:ext cx="2211884" cy="2133600"/>
+            <a:off x="1119718" y="609600"/>
+            <a:ext cx="5242983" cy="2133600"/>
           </a:xfrm>
         </p:spPr>
         <p:txBody>
           <a:bodyPr anchor="b"/>
           <a:lstStyle>
             <a:lvl1pPr>
-              <a:defRPr sz="2400"/>
+              <a:defRPr sz="4267"/>
             </a:lvl1pPr>
           </a:lstStyle>
           <a:p>
@@ -1945,39 +1948,39 @@
         </p:nvSpPr>
         <p:spPr>
           <a:xfrm>
-            <a:off x="2915543" y="1316569"/>
-            <a:ext cx="3471863" cy="6498167"/>
+            <a:off x="6910917" y="1316567"/>
+            <a:ext cx="8229600" cy="6498167"/>
           </a:xfrm>
         </p:spPr>
         <p:txBody>
           <a:bodyPr/>
           <a:lstStyle>
             <a:lvl1pPr>
-              <a:defRPr sz="2400"/>
+              <a:defRPr sz="4267"/>
             </a:lvl1pPr>
             <a:lvl2pPr>
-              <a:defRPr sz="2100"/>
+              <a:defRPr sz="3733"/>
             </a:lvl2pPr>
             <a:lvl3pPr>
-              <a:defRPr sz="1800"/>
+              <a:defRPr sz="3200"/>
             </a:lvl3pPr>
             <a:lvl4pPr>
-              <a:defRPr sz="1500"/>
+              <a:defRPr sz="2667"/>
             </a:lvl4pPr>
             <a:lvl5pPr>
-              <a:defRPr sz="1500"/>
+              <a:defRPr sz="2667"/>
             </a:lvl5pPr>
             <a:lvl6pPr>
-              <a:defRPr sz="1500"/>
+              <a:defRPr sz="2667"/>
             </a:lvl6pPr>
             <a:lvl7pPr>
-              <a:defRPr sz="1500"/>
+              <a:defRPr sz="2667"/>
             </a:lvl7pPr>
             <a:lvl8pPr>
-              <a:defRPr sz="1500"/>
+              <a:defRPr sz="2667"/>
             </a:lvl8pPr>
             <a:lvl9pPr>
-              <a:defRPr sz="1500"/>
+              <a:defRPr sz="2667"/>
             </a:lvl9pPr>
           </a:lstStyle>
           <a:p>
@@ -2030,8 +2033,8 @@
         </p:nvSpPr>
         <p:spPr>
           <a:xfrm>
-            <a:off x="472381" y="2743200"/>
-            <a:ext cx="2211884" cy="5082117"/>
+            <a:off x="1119718" y="2743200"/>
+            <a:ext cx="5242983" cy="5082117"/>
           </a:xfrm>
         </p:spPr>
         <p:txBody>
@@ -2039,39 +2042,39 @@
           <a:lstStyle>
             <a:lvl1pPr marL="0" indent="0">
               <a:buNone/>
-              <a:defRPr sz="1200"/>
+              <a:defRPr sz="2133"/>
             </a:lvl1pPr>
-            <a:lvl2pPr marL="342900" indent="0">
-              <a:buNone/>
-              <a:defRPr sz="1050"/>
+            <a:lvl2pPr marL="609585" indent="0">
+              <a:buNone/>
+              <a:defRPr sz="1867"/>
             </a:lvl2pPr>
-            <a:lvl3pPr marL="685800" indent="0">
-              <a:buNone/>
-              <a:defRPr sz="900"/>
+            <a:lvl3pPr marL="1219170" indent="0">
+              <a:buNone/>
+              <a:defRPr sz="1600"/>
             </a:lvl3pPr>
-            <a:lvl4pPr marL="1028700" indent="0">
-              <a:buNone/>
-              <a:defRPr sz="750"/>
+            <a:lvl4pPr marL="1828754" indent="0">
+              <a:buNone/>
+              <a:defRPr sz="1333"/>
             </a:lvl4pPr>
-            <a:lvl5pPr marL="1371600" indent="0">
-              <a:buNone/>
-              <a:defRPr sz="750"/>
+            <a:lvl5pPr marL="2438339" indent="0">
+              <a:buNone/>
+              <a:defRPr sz="1333"/>
             </a:lvl5pPr>
-            <a:lvl6pPr marL="1714500" indent="0">
-              <a:buNone/>
-              <a:defRPr sz="750"/>
+            <a:lvl6pPr marL="3047924" indent="0">
+              <a:buNone/>
+              <a:defRPr sz="1333"/>
             </a:lvl6pPr>
-            <a:lvl7pPr marL="2057400" indent="0">
-              <a:buNone/>
-              <a:defRPr sz="750"/>
+            <a:lvl7pPr marL="3657509" indent="0">
+              <a:buNone/>
+              <a:defRPr sz="1333"/>
             </a:lvl7pPr>
-            <a:lvl8pPr marL="2400300" indent="0">
-              <a:buNone/>
-              <a:defRPr sz="750"/>
+            <a:lvl8pPr marL="4267093" indent="0">
+              <a:buNone/>
+              <a:defRPr sz="1333"/>
             </a:lvl8pPr>
-            <a:lvl9pPr marL="2743200" indent="0">
-              <a:buNone/>
-              <a:defRPr sz="750"/>
+            <a:lvl9pPr marL="4876678" indent="0">
+              <a:buNone/>
+              <a:defRPr sz="1333"/>
             </a:lvl9pPr>
           </a:lstStyle>
           <a:p>
@@ -2100,7 +2103,7 @@
           <a:p>
             <a:fld id="{4728A198-E1B1-4E07-BA63-B848E5929EE6}" type="datetimeFigureOut">
               <a:rPr lang="en-US" smtClean="0"/>
-              <a:t>8/13/2025</a:t>
+              <a:t>11/20/2025</a:t>
             </a:fld>
             <a:endParaRPr lang="en-US"/>
           </a:p>
@@ -2151,7 +2154,7 @@
     </p:spTree>
     <p:extLst>
       <p:ext uri="{BB962C8B-B14F-4D97-AF65-F5344CB8AC3E}">
-        <p14:creationId xmlns:p14="http://schemas.microsoft.com/office/powerpoint/2010/main" val="2036101361"/>
+        <p14:creationId xmlns:p14="http://schemas.microsoft.com/office/powerpoint/2010/main" val="4035423215"/>
       </p:ext>
     </p:extLst>
   </p:cSld>
@@ -2190,15 +2193,15 @@
         </p:nvSpPr>
         <p:spPr>
           <a:xfrm>
-            <a:off x="472381" y="609600"/>
-            <a:ext cx="2211884" cy="2133600"/>
+            <a:off x="1119718" y="609600"/>
+            <a:ext cx="5242983" cy="2133600"/>
           </a:xfrm>
         </p:spPr>
         <p:txBody>
           <a:bodyPr anchor="b"/>
           <a:lstStyle>
             <a:lvl1pPr>
-              <a:defRPr sz="2400"/>
+              <a:defRPr sz="4267"/>
             </a:lvl1pPr>
           </a:lstStyle>
           <a:p>
@@ -2222,8 +2225,8 @@
         </p:nvSpPr>
         <p:spPr>
           <a:xfrm>
-            <a:off x="2915543" y="1316569"/>
-            <a:ext cx="3471863" cy="6498167"/>
+            <a:off x="6910917" y="1316567"/>
+            <a:ext cx="8229600" cy="6498167"/>
           </a:xfrm>
         </p:spPr>
         <p:txBody>
@@ -2231,39 +2234,39 @@
           <a:lstStyle>
             <a:lvl1pPr marL="0" indent="0">
               <a:buNone/>
-              <a:defRPr sz="2400"/>
+              <a:defRPr sz="4267"/>
             </a:lvl1pPr>
-            <a:lvl2pPr marL="342900" indent="0">
-              <a:buNone/>
-              <a:defRPr sz="2100"/>
+            <a:lvl2pPr marL="609585" indent="0">
+              <a:buNone/>
+              <a:defRPr sz="3733"/>
             </a:lvl2pPr>
-            <a:lvl3pPr marL="685800" indent="0">
-              <a:buNone/>
-              <a:defRPr sz="1800"/>
+            <a:lvl3pPr marL="1219170" indent="0">
+              <a:buNone/>
+              <a:defRPr sz="3200"/>
             </a:lvl3pPr>
-            <a:lvl4pPr marL="1028700" indent="0">
-              <a:buNone/>
-              <a:defRPr sz="1500"/>
+            <a:lvl4pPr marL="1828754" indent="0">
+              <a:buNone/>
+              <a:defRPr sz="2667"/>
             </a:lvl4pPr>
-            <a:lvl5pPr marL="1371600" indent="0">
-              <a:buNone/>
-              <a:defRPr sz="1500"/>
+            <a:lvl5pPr marL="2438339" indent="0">
+              <a:buNone/>
+              <a:defRPr sz="2667"/>
             </a:lvl5pPr>
-            <a:lvl6pPr marL="1714500" indent="0">
-              <a:buNone/>
-              <a:defRPr sz="1500"/>
+            <a:lvl6pPr marL="3047924" indent="0">
+              <a:buNone/>
+              <a:defRPr sz="2667"/>
             </a:lvl6pPr>
-            <a:lvl7pPr marL="2057400" indent="0">
-              <a:buNone/>
-              <a:defRPr sz="1500"/>
+            <a:lvl7pPr marL="3657509" indent="0">
+              <a:buNone/>
+              <a:defRPr sz="2667"/>
             </a:lvl7pPr>
-            <a:lvl8pPr marL="2400300" indent="0">
-              <a:buNone/>
-              <a:defRPr sz="1500"/>
+            <a:lvl8pPr marL="4267093" indent="0">
+              <a:buNone/>
+              <a:defRPr sz="2667"/>
             </a:lvl8pPr>
-            <a:lvl9pPr marL="2743200" indent="0">
-              <a:buNone/>
-              <a:defRPr sz="1500"/>
+            <a:lvl9pPr marL="4876678" indent="0">
+              <a:buNone/>
+              <a:defRPr sz="2667"/>
             </a:lvl9pPr>
           </a:lstStyle>
           <a:p>
@@ -2287,8 +2290,8 @@
         </p:nvSpPr>
         <p:spPr>
           <a:xfrm>
-            <a:off x="472381" y="2743200"/>
-            <a:ext cx="2211884" cy="5082117"/>
+            <a:off x="1119718" y="2743200"/>
+            <a:ext cx="5242983" cy="5082117"/>
           </a:xfrm>
         </p:spPr>
         <p:txBody>
@@ -2296,39 +2299,39 @@
           <a:lstStyle>
             <a:lvl1pPr marL="0" indent="0">
               <a:buNone/>
-              <a:defRPr sz="1200"/>
+              <a:defRPr sz="2133"/>
             </a:lvl1pPr>
-            <a:lvl2pPr marL="342900" indent="0">
-              <a:buNone/>
-              <a:defRPr sz="1050"/>
+            <a:lvl2pPr marL="609585" indent="0">
+              <a:buNone/>
+              <a:defRPr sz="1867"/>
             </a:lvl2pPr>
-            <a:lvl3pPr marL="685800" indent="0">
-              <a:buNone/>
-              <a:defRPr sz="900"/>
+            <a:lvl3pPr marL="1219170" indent="0">
+              <a:buNone/>
+              <a:defRPr sz="1600"/>
             </a:lvl3pPr>
-            <a:lvl4pPr marL="1028700" indent="0">
-              <a:buNone/>
-              <a:defRPr sz="750"/>
+            <a:lvl4pPr marL="1828754" indent="0">
+              <a:buNone/>
+              <a:defRPr sz="1333"/>
             </a:lvl4pPr>
-            <a:lvl5pPr marL="1371600" indent="0">
-              <a:buNone/>
-              <a:defRPr sz="750"/>
+            <a:lvl5pPr marL="2438339" indent="0">
+              <a:buNone/>
+              <a:defRPr sz="1333"/>
             </a:lvl5pPr>
-            <a:lvl6pPr marL="1714500" indent="0">
-              <a:buNone/>
-              <a:defRPr sz="750"/>
+            <a:lvl6pPr marL="3047924" indent="0">
+              <a:buNone/>
+              <a:defRPr sz="1333"/>
             </a:lvl6pPr>
-            <a:lvl7pPr marL="2057400" indent="0">
-              <a:buNone/>
-              <a:defRPr sz="750"/>
+            <a:lvl7pPr marL="3657509" indent="0">
+              <a:buNone/>
+              <a:defRPr sz="1333"/>
             </a:lvl7pPr>
-            <a:lvl8pPr marL="2400300" indent="0">
-              <a:buNone/>
-              <a:defRPr sz="750"/>
+            <a:lvl8pPr marL="4267093" indent="0">
+              <a:buNone/>
+              <a:defRPr sz="1333"/>
             </a:lvl8pPr>
-            <a:lvl9pPr marL="2743200" indent="0">
-              <a:buNone/>
-              <a:defRPr sz="750"/>
+            <a:lvl9pPr marL="4876678" indent="0">
+              <a:buNone/>
+              <a:defRPr sz="1333"/>
             </a:lvl9pPr>
           </a:lstStyle>
           <a:p>
@@ -2357,7 +2360,7 @@
           <a:p>
             <a:fld id="{4728A198-E1B1-4E07-BA63-B848E5929EE6}" type="datetimeFigureOut">
               <a:rPr lang="en-US" smtClean="0"/>
-              <a:t>8/13/2025</a:t>
+              <a:t>11/20/2025</a:t>
             </a:fld>
             <a:endParaRPr lang="en-US"/>
           </a:p>
@@ -2408,7 +2411,7 @@
     </p:spTree>
     <p:extLst>
       <p:ext uri="{BB962C8B-B14F-4D97-AF65-F5344CB8AC3E}">
-        <p14:creationId xmlns:p14="http://schemas.microsoft.com/office/powerpoint/2010/main" val="2044451823"/>
+        <p14:creationId xmlns:p14="http://schemas.microsoft.com/office/powerpoint/2010/main" val="1262613690"/>
       </p:ext>
     </p:extLst>
   </p:cSld>
@@ -2452,8 +2455,8 @@
         </p:nvSpPr>
         <p:spPr>
           <a:xfrm>
-            <a:off x="471488" y="486836"/>
-            <a:ext cx="5915025" cy="1767417"/>
+            <a:off x="1117600" y="486834"/>
+            <a:ext cx="14020800" cy="1767417"/>
           </a:xfrm>
           <a:prstGeom prst="rect">
             <a:avLst/>
@@ -2485,8 +2488,8 @@
         </p:nvSpPr>
         <p:spPr>
           <a:xfrm>
-            <a:off x="471488" y="2434167"/>
-            <a:ext cx="5915025" cy="5801784"/>
+            <a:off x="1117600" y="2434167"/>
+            <a:ext cx="14020800" cy="5801784"/>
           </a:xfrm>
           <a:prstGeom prst="rect">
             <a:avLst/>
@@ -2547,8 +2550,8 @@
         </p:nvSpPr>
         <p:spPr>
           <a:xfrm>
-            <a:off x="471488" y="8475136"/>
-            <a:ext cx="1543050" cy="486833"/>
+            <a:off x="1117600" y="8475134"/>
+            <a:ext cx="3657600" cy="486833"/>
           </a:xfrm>
           <a:prstGeom prst="rect">
             <a:avLst/>
@@ -2558,7 +2561,7 @@
           <a:bodyPr vert="horz" lIns="91440" tIns="45720" rIns="91440" bIns="45720" rtlCol="0" anchor="ctr"/>
           <a:lstStyle>
             <a:lvl1pPr algn="l">
-              <a:defRPr sz="900">
+              <a:defRPr sz="1600">
                 <a:solidFill>
                   <a:schemeClr val="tx1">
                     <a:tint val="75000"/>
@@ -2570,7 +2573,7 @@
           <a:p>
             <a:fld id="{4728A198-E1B1-4E07-BA63-B848E5929EE6}" type="datetimeFigureOut">
               <a:rPr lang="en-US" smtClean="0"/>
-              <a:t>8/13/2025</a:t>
+              <a:t>11/20/2025</a:t>
             </a:fld>
             <a:endParaRPr lang="en-US"/>
           </a:p>
@@ -2588,8 +2591,8 @@
         </p:nvSpPr>
         <p:spPr>
           <a:xfrm>
-            <a:off x="2271713" y="8475136"/>
-            <a:ext cx="2314575" cy="486833"/>
+            <a:off x="5384800" y="8475134"/>
+            <a:ext cx="5486400" cy="486833"/>
           </a:xfrm>
           <a:prstGeom prst="rect">
             <a:avLst/>
@@ -2599,7 +2602,7 @@
           <a:bodyPr vert="horz" lIns="91440" tIns="45720" rIns="91440" bIns="45720" rtlCol="0" anchor="ctr"/>
           <a:lstStyle>
             <a:lvl1pPr algn="ctr">
-              <a:defRPr sz="900">
+              <a:defRPr sz="1600">
                 <a:solidFill>
                   <a:schemeClr val="tx1">
                     <a:tint val="75000"/>
@@ -2625,8 +2628,8 @@
         </p:nvSpPr>
         <p:spPr>
           <a:xfrm>
-            <a:off x="4843463" y="8475136"/>
-            <a:ext cx="1543050" cy="486833"/>
+            <a:off x="11480800" y="8475134"/>
+            <a:ext cx="3657600" cy="486833"/>
           </a:xfrm>
           <a:prstGeom prst="rect">
             <a:avLst/>
@@ -2636,7 +2639,7 @@
           <a:bodyPr vert="horz" lIns="91440" tIns="45720" rIns="91440" bIns="45720" rtlCol="0" anchor="ctr"/>
           <a:lstStyle>
             <a:lvl1pPr algn="r">
-              <a:defRPr sz="900">
+              <a:defRPr sz="1600">
                 <a:solidFill>
                   <a:schemeClr val="tx1">
                     <a:tint val="75000"/>
@@ -2657,27 +2660,27 @@
     </p:spTree>
     <p:extLst>
       <p:ext uri="{BB962C8B-B14F-4D97-AF65-F5344CB8AC3E}">
-        <p14:creationId xmlns:p14="http://schemas.microsoft.com/office/powerpoint/2010/main" val="3466381621"/>
+        <p14:creationId xmlns:p14="http://schemas.microsoft.com/office/powerpoint/2010/main" val="435066545"/>
       </p:ext>
     </p:extLst>
   </p:cSld>
   <p:clrMap bg1="lt1" tx1="dk1" bg2="lt2" tx2="dk2" accent1="accent1" accent2="accent2" accent3="accent3" accent4="accent4" accent5="accent5" accent6="accent6" hlink="hlink" folHlink="folHlink"/>
   <p:sldLayoutIdLst>
-    <p:sldLayoutId id="2147483685" r:id="rId1"/>
-    <p:sldLayoutId id="2147483686" r:id="rId2"/>
-    <p:sldLayoutId id="2147483687" r:id="rId3"/>
-    <p:sldLayoutId id="2147483688" r:id="rId4"/>
-    <p:sldLayoutId id="2147483689" r:id="rId5"/>
-    <p:sldLayoutId id="2147483690" r:id="rId6"/>
-    <p:sldLayoutId id="2147483691" r:id="rId7"/>
-    <p:sldLayoutId id="2147483692" r:id="rId8"/>
-    <p:sldLayoutId id="2147483693" r:id="rId9"/>
-    <p:sldLayoutId id="2147483694" r:id="rId10"/>
-    <p:sldLayoutId id="2147483695" r:id="rId11"/>
+    <p:sldLayoutId id="2147483697" r:id="rId1"/>
+    <p:sldLayoutId id="2147483698" r:id="rId2"/>
+    <p:sldLayoutId id="2147483699" r:id="rId3"/>
+    <p:sldLayoutId id="2147483700" r:id="rId4"/>
+    <p:sldLayoutId id="2147483701" r:id="rId5"/>
+    <p:sldLayoutId id="2147483702" r:id="rId6"/>
+    <p:sldLayoutId id="2147483703" r:id="rId7"/>
+    <p:sldLayoutId id="2147483704" r:id="rId8"/>
+    <p:sldLayoutId id="2147483705" r:id="rId9"/>
+    <p:sldLayoutId id="2147483706" r:id="rId10"/>
+    <p:sldLayoutId id="2147483707" r:id="rId11"/>
   </p:sldLayoutIdLst>
   <p:txStyles>
     <p:titleStyle>
-      <a:lvl1pPr algn="l" defTabSz="685800" rtl="0" eaLnBrk="1" latinLnBrk="0" hangingPunct="1">
+      <a:lvl1pPr algn="l" defTabSz="1219170" rtl="0" eaLnBrk="1" latinLnBrk="0" hangingPunct="1">
         <a:lnSpc>
           <a:spcPct val="90000"/>
         </a:lnSpc>
@@ -2685,7 +2688,7 @@
           <a:spcPct val="0"/>
         </a:spcBef>
         <a:buNone/>
-        <a:defRPr sz="3300" kern="1200">
+        <a:defRPr sz="5867" kern="1200">
           <a:solidFill>
             <a:schemeClr val="tx1"/>
           </a:solidFill>
@@ -2696,16 +2699,16 @@
       </a:lvl1pPr>
     </p:titleStyle>
     <p:bodyStyle>
-      <a:lvl1pPr marL="171450" indent="-171450" algn="l" defTabSz="685800" rtl="0" eaLnBrk="1" latinLnBrk="0" hangingPunct="1">
+      <a:lvl1pPr marL="304792" indent="-304792" algn="l" defTabSz="1219170" rtl="0" eaLnBrk="1" latinLnBrk="0" hangingPunct="1">
         <a:lnSpc>
           <a:spcPct val="90000"/>
         </a:lnSpc>
         <a:spcBef>
-          <a:spcPts val="750"/>
+          <a:spcPts val="1333"/>
         </a:spcBef>
         <a:buFont typeface="Arial" panose="020B0604020202020204" pitchFamily="34" charset="0"/>
         <a:buChar char="•"/>
-        <a:defRPr sz="2100" kern="1200">
+        <a:defRPr sz="3733" kern="1200">
           <a:solidFill>
             <a:schemeClr val="tx1"/>
           </a:solidFill>
@@ -2714,16 +2717,16 @@
           <a:cs typeface="+mn-cs"/>
         </a:defRPr>
       </a:lvl1pPr>
-      <a:lvl2pPr marL="514350" indent="-171450" algn="l" defTabSz="685800" rtl="0" eaLnBrk="1" latinLnBrk="0" hangingPunct="1">
+      <a:lvl2pPr marL="914377" indent="-304792" algn="l" defTabSz="1219170" rtl="0" eaLnBrk="1" latinLnBrk="0" hangingPunct="1">
         <a:lnSpc>
           <a:spcPct val="90000"/>
         </a:lnSpc>
         <a:spcBef>
-          <a:spcPts val="375"/>
+          <a:spcPts val="667"/>
         </a:spcBef>
         <a:buFont typeface="Arial" panose="020B0604020202020204" pitchFamily="34" charset="0"/>
         <a:buChar char="•"/>
-        <a:defRPr sz="1800" kern="1200">
+        <a:defRPr sz="3200" kern="1200">
           <a:solidFill>
             <a:schemeClr val="tx1"/>
           </a:solidFill>
@@ -2732,16 +2735,16 @@
           <a:cs typeface="+mn-cs"/>
         </a:defRPr>
       </a:lvl2pPr>
-      <a:lvl3pPr marL="857250" indent="-171450" algn="l" defTabSz="685800" rtl="0" eaLnBrk="1" latinLnBrk="0" hangingPunct="1">
+      <a:lvl3pPr marL="1523962" indent="-304792" algn="l" defTabSz="1219170" rtl="0" eaLnBrk="1" latinLnBrk="0" hangingPunct="1">
         <a:lnSpc>
           <a:spcPct val="90000"/>
         </a:lnSpc>
         <a:spcBef>
-          <a:spcPts val="375"/>
+          <a:spcPts val="667"/>
         </a:spcBef>
         <a:buFont typeface="Arial" panose="020B0604020202020204" pitchFamily="34" charset="0"/>
         <a:buChar char="•"/>
-        <a:defRPr sz="1500" kern="1200">
+        <a:defRPr sz="2667" kern="1200">
           <a:solidFill>
             <a:schemeClr val="tx1"/>
           </a:solidFill>
@@ -2750,16 +2753,16 @@
           <a:cs typeface="+mn-cs"/>
         </a:defRPr>
       </a:lvl3pPr>
-      <a:lvl4pPr marL="1200150" indent="-171450" algn="l" defTabSz="685800" rtl="0" eaLnBrk="1" latinLnBrk="0" hangingPunct="1">
+      <a:lvl4pPr marL="2133547" indent="-304792" algn="l" defTabSz="1219170" rtl="0" eaLnBrk="1" latinLnBrk="0" hangingPunct="1">
         <a:lnSpc>
           <a:spcPct val="90000"/>
         </a:lnSpc>
         <a:spcBef>
-          <a:spcPts val="375"/>
+          <a:spcPts val="667"/>
         </a:spcBef>
         <a:buFont typeface="Arial" panose="020B0604020202020204" pitchFamily="34" charset="0"/>
         <a:buChar char="•"/>
-        <a:defRPr sz="1350" kern="1200">
+        <a:defRPr sz="2400" kern="1200">
           <a:solidFill>
             <a:schemeClr val="tx1"/>
           </a:solidFill>
@@ -2768,16 +2771,16 @@
           <a:cs typeface="+mn-cs"/>
         </a:defRPr>
       </a:lvl4pPr>
-      <a:lvl5pPr marL="1543050" indent="-171450" algn="l" defTabSz="685800" rtl="0" eaLnBrk="1" latinLnBrk="0" hangingPunct="1">
+      <a:lvl5pPr marL="2743131" indent="-304792" algn="l" defTabSz="1219170" rtl="0" eaLnBrk="1" latinLnBrk="0" hangingPunct="1">
         <a:lnSpc>
           <a:spcPct val="90000"/>
         </a:lnSpc>
         <a:spcBef>
-          <a:spcPts val="375"/>
+          <a:spcPts val="667"/>
         </a:spcBef>
         <a:buFont typeface="Arial" panose="020B0604020202020204" pitchFamily="34" charset="0"/>
         <a:buChar char="•"/>
-        <a:defRPr sz="1350" kern="1200">
+        <a:defRPr sz="2400" kern="1200">
           <a:solidFill>
             <a:schemeClr val="tx1"/>
           </a:solidFill>
@@ -2786,16 +2789,16 @@
           <a:cs typeface="+mn-cs"/>
         </a:defRPr>
       </a:lvl5pPr>
-      <a:lvl6pPr marL="1885950" indent="-171450" algn="l" defTabSz="685800" rtl="0" eaLnBrk="1" latinLnBrk="0" hangingPunct="1">
+      <a:lvl6pPr marL="3352716" indent="-304792" algn="l" defTabSz="1219170" rtl="0" eaLnBrk="1" latinLnBrk="0" hangingPunct="1">
         <a:lnSpc>
           <a:spcPct val="90000"/>
         </a:lnSpc>
         <a:spcBef>
-          <a:spcPts val="375"/>
+          <a:spcPts val="667"/>
         </a:spcBef>
         <a:buFont typeface="Arial" panose="020B0604020202020204" pitchFamily="34" charset="0"/>
         <a:buChar char="•"/>
-        <a:defRPr sz="1350" kern="1200">
+        <a:defRPr sz="2400" kern="1200">
           <a:solidFill>
             <a:schemeClr val="tx1"/>
           </a:solidFill>
@@ -2804,16 +2807,16 @@
           <a:cs typeface="+mn-cs"/>
         </a:defRPr>
       </a:lvl6pPr>
-      <a:lvl7pPr marL="2228850" indent="-171450" algn="l" defTabSz="685800" rtl="0" eaLnBrk="1" latinLnBrk="0" hangingPunct="1">
+      <a:lvl7pPr marL="3962301" indent="-304792" algn="l" defTabSz="1219170" rtl="0" eaLnBrk="1" latinLnBrk="0" hangingPunct="1">
         <a:lnSpc>
           <a:spcPct val="90000"/>
         </a:lnSpc>
         <a:spcBef>
-          <a:spcPts val="375"/>
+          <a:spcPts val="667"/>
         </a:spcBef>
         <a:buFont typeface="Arial" panose="020B0604020202020204" pitchFamily="34" charset="0"/>
         <a:buChar char="•"/>
-        <a:defRPr sz="1350" kern="1200">
+        <a:defRPr sz="2400" kern="1200">
           <a:solidFill>
             <a:schemeClr val="tx1"/>
           </a:solidFill>
@@ -2822,16 +2825,16 @@
           <a:cs typeface="+mn-cs"/>
         </a:defRPr>
       </a:lvl7pPr>
-      <a:lvl8pPr marL="2571750" indent="-171450" algn="l" defTabSz="685800" rtl="0" eaLnBrk="1" latinLnBrk="0" hangingPunct="1">
+      <a:lvl8pPr marL="4571886" indent="-304792" algn="l" defTabSz="1219170" rtl="0" eaLnBrk="1" latinLnBrk="0" hangingPunct="1">
         <a:lnSpc>
           <a:spcPct val="90000"/>
         </a:lnSpc>
         <a:spcBef>
-          <a:spcPts val="375"/>
+          <a:spcPts val="667"/>
         </a:spcBef>
         <a:buFont typeface="Arial" panose="020B0604020202020204" pitchFamily="34" charset="0"/>
         <a:buChar char="•"/>
-        <a:defRPr sz="1350" kern="1200">
+        <a:defRPr sz="2400" kern="1200">
           <a:solidFill>
             <a:schemeClr val="tx1"/>
           </a:solidFill>
@@ -2840,16 +2843,16 @@
           <a:cs typeface="+mn-cs"/>
         </a:defRPr>
       </a:lvl8pPr>
-      <a:lvl9pPr marL="2914650" indent="-171450" algn="l" defTabSz="685800" rtl="0" eaLnBrk="1" latinLnBrk="0" hangingPunct="1">
+      <a:lvl9pPr marL="5181470" indent="-304792" algn="l" defTabSz="1219170" rtl="0" eaLnBrk="1" latinLnBrk="0" hangingPunct="1">
         <a:lnSpc>
           <a:spcPct val="90000"/>
         </a:lnSpc>
         <a:spcBef>
-          <a:spcPts val="375"/>
+          <a:spcPts val="667"/>
         </a:spcBef>
         <a:buFont typeface="Arial" panose="020B0604020202020204" pitchFamily="34" charset="0"/>
         <a:buChar char="•"/>
-        <a:defRPr sz="1350" kern="1200">
+        <a:defRPr sz="2400" kern="1200">
           <a:solidFill>
             <a:schemeClr val="tx1"/>
           </a:solidFill>
@@ -2863,8 +2866,8 @@
       <a:defPPr>
         <a:defRPr lang="en-US"/>
       </a:defPPr>
-      <a:lvl1pPr marL="0" algn="l" defTabSz="685800" rtl="0" eaLnBrk="1" latinLnBrk="0" hangingPunct="1">
-        <a:defRPr sz="1350" kern="1200">
+      <a:lvl1pPr marL="0" algn="l" defTabSz="1219170" rtl="0" eaLnBrk="1" latinLnBrk="0" hangingPunct="1">
+        <a:defRPr sz="2400" kern="1200">
           <a:solidFill>
             <a:schemeClr val="tx1"/>
           </a:solidFill>
@@ -2873,8 +2876,8 @@
           <a:cs typeface="+mn-cs"/>
         </a:defRPr>
       </a:lvl1pPr>
-      <a:lvl2pPr marL="342900" algn="l" defTabSz="685800" rtl="0" eaLnBrk="1" latinLnBrk="0" hangingPunct="1">
-        <a:defRPr sz="1350" kern="1200">
+      <a:lvl2pPr marL="609585" algn="l" defTabSz="1219170" rtl="0" eaLnBrk="1" latinLnBrk="0" hangingPunct="1">
+        <a:defRPr sz="2400" kern="1200">
           <a:solidFill>
             <a:schemeClr val="tx1"/>
           </a:solidFill>
@@ -2883,8 +2886,8 @@
           <a:cs typeface="+mn-cs"/>
         </a:defRPr>
       </a:lvl2pPr>
-      <a:lvl3pPr marL="685800" algn="l" defTabSz="685800" rtl="0" eaLnBrk="1" latinLnBrk="0" hangingPunct="1">
-        <a:defRPr sz="1350" kern="1200">
+      <a:lvl3pPr marL="1219170" algn="l" defTabSz="1219170" rtl="0" eaLnBrk="1" latinLnBrk="0" hangingPunct="1">
+        <a:defRPr sz="2400" kern="1200">
           <a:solidFill>
             <a:schemeClr val="tx1"/>
           </a:solidFill>
@@ -2893,8 +2896,8 @@
           <a:cs typeface="+mn-cs"/>
         </a:defRPr>
       </a:lvl3pPr>
-      <a:lvl4pPr marL="1028700" algn="l" defTabSz="685800" rtl="0" eaLnBrk="1" latinLnBrk="0" hangingPunct="1">
-        <a:defRPr sz="1350" kern="1200">
+      <a:lvl4pPr marL="1828754" algn="l" defTabSz="1219170" rtl="0" eaLnBrk="1" latinLnBrk="0" hangingPunct="1">
+        <a:defRPr sz="2400" kern="1200">
           <a:solidFill>
             <a:schemeClr val="tx1"/>
           </a:solidFill>
@@ -2903,8 +2906,8 @@
           <a:cs typeface="+mn-cs"/>
         </a:defRPr>
       </a:lvl4pPr>
-      <a:lvl5pPr marL="1371600" algn="l" defTabSz="685800" rtl="0" eaLnBrk="1" latinLnBrk="0" hangingPunct="1">
-        <a:defRPr sz="1350" kern="1200">
+      <a:lvl5pPr marL="2438339" algn="l" defTabSz="1219170" rtl="0" eaLnBrk="1" latinLnBrk="0" hangingPunct="1">
+        <a:defRPr sz="2400" kern="1200">
           <a:solidFill>
             <a:schemeClr val="tx1"/>
           </a:solidFill>
@@ -2913,8 +2916,8 @@
           <a:cs typeface="+mn-cs"/>
         </a:defRPr>
       </a:lvl5pPr>
-      <a:lvl6pPr marL="1714500" algn="l" defTabSz="685800" rtl="0" eaLnBrk="1" latinLnBrk="0" hangingPunct="1">
-        <a:defRPr sz="1350" kern="1200">
+      <a:lvl6pPr marL="3047924" algn="l" defTabSz="1219170" rtl="0" eaLnBrk="1" latinLnBrk="0" hangingPunct="1">
+        <a:defRPr sz="2400" kern="1200">
           <a:solidFill>
             <a:schemeClr val="tx1"/>
           </a:solidFill>
@@ -2923,8 +2926,8 @@
           <a:cs typeface="+mn-cs"/>
         </a:defRPr>
       </a:lvl6pPr>
-      <a:lvl7pPr marL="2057400" algn="l" defTabSz="685800" rtl="0" eaLnBrk="1" latinLnBrk="0" hangingPunct="1">
-        <a:defRPr sz="1350" kern="1200">
+      <a:lvl7pPr marL="3657509" algn="l" defTabSz="1219170" rtl="0" eaLnBrk="1" latinLnBrk="0" hangingPunct="1">
+        <a:defRPr sz="2400" kern="1200">
           <a:solidFill>
             <a:schemeClr val="tx1"/>
           </a:solidFill>
@@ -2933,8 +2936,8 @@
           <a:cs typeface="+mn-cs"/>
         </a:defRPr>
       </a:lvl7pPr>
-      <a:lvl8pPr marL="2400300" algn="l" defTabSz="685800" rtl="0" eaLnBrk="1" latinLnBrk="0" hangingPunct="1">
-        <a:defRPr sz="1350" kern="1200">
+      <a:lvl8pPr marL="4267093" algn="l" defTabSz="1219170" rtl="0" eaLnBrk="1" latinLnBrk="0" hangingPunct="1">
+        <a:defRPr sz="2400" kern="1200">
           <a:solidFill>
             <a:schemeClr val="tx1"/>
           </a:solidFill>
@@ -2943,8 +2946,8 @@
           <a:cs typeface="+mn-cs"/>
         </a:defRPr>
       </a:lvl8pPr>
-      <a:lvl9pPr marL="2743200" algn="l" defTabSz="685800" rtl="0" eaLnBrk="1" latinLnBrk="0" hangingPunct="1">
-        <a:defRPr sz="1350" kern="1200">
+      <a:lvl9pPr marL="4876678" algn="l" defTabSz="1219170" rtl="0" eaLnBrk="1" latinLnBrk="0" hangingPunct="1">
+        <a:defRPr sz="2400" kern="1200">
           <a:solidFill>
             <a:schemeClr val="tx1"/>
           </a:solidFill>
@@ -2977,6 +2980,102 @@
       </p:grpSpPr>
       <p:sp>
         <p:nvSpPr>
+          <p:cNvPr id="2" name="Title 1">
+            <a:extLst>
+              <a:ext uri="{FF2B5EF4-FFF2-40B4-BE49-F238E27FC236}">
+                <a16:creationId xmlns:a16="http://schemas.microsoft.com/office/drawing/2014/main" id="{EEFB18E8-03C6-AFC6-02BE-0E22C3791AD2}"/>
+              </a:ext>
+            </a:extLst>
+          </p:cNvPr>
+          <p:cNvSpPr>
+            <a:spLocks noGrp="1"/>
+          </p:cNvSpPr>
+          <p:nvPr>
+            <p:ph type="title"/>
+          </p:nvPr>
+        </p:nvSpPr>
+        <p:spPr/>
+        <p:txBody>
+          <a:bodyPr/>
+          <a:lstStyle/>
+          <a:p>
+            <a:r>
+              <a:rPr lang="en-US" dirty="0"/>
+              <a:t>Map Routines Calling Trees</a:t>
+            </a:r>
+          </a:p>
+        </p:txBody>
+      </p:sp>
+      <p:sp>
+        <p:nvSpPr>
+          <p:cNvPr id="3" name="Content Placeholder 2">
+            <a:extLst>
+              <a:ext uri="{FF2B5EF4-FFF2-40B4-BE49-F238E27FC236}">
+                <a16:creationId xmlns:a16="http://schemas.microsoft.com/office/drawing/2014/main" id="{C230A609-764A-A6EB-C6C8-FA44FCB0FA31}"/>
+              </a:ext>
+            </a:extLst>
+          </p:cNvPr>
+          <p:cNvSpPr>
+            <a:spLocks noGrp="1"/>
+          </p:cNvSpPr>
+          <p:nvPr>
+            <p:ph idx="1"/>
+          </p:nvPr>
+        </p:nvSpPr>
+        <p:spPr/>
+        <p:txBody>
+          <a:bodyPr/>
+          <a:lstStyle/>
+          <a:p>
+            <a:r>
+              <a:rPr lang="en-US" dirty="0">
+                <a:solidFill>
+                  <a:srgbClr val="C00000"/>
+                </a:solidFill>
+              </a:rPr>
+              <a:t>Needs major update since splitting creation, plotting, and analysis routines – SMH 2025-11-20</a:t>
+            </a:r>
+          </a:p>
+          <a:p>
+            <a:pPr marL="0" indent="0">
+              <a:buNone/>
+            </a:pPr>
+            <a:endParaRPr lang="en-US" dirty="0"/>
+          </a:p>
+        </p:txBody>
+      </p:sp>
+    </p:spTree>
+    <p:extLst>
+      <p:ext uri="{BB962C8B-B14F-4D97-AF65-F5344CB8AC3E}">
+        <p14:creationId xmlns:p14="http://schemas.microsoft.com/office/powerpoint/2010/main" val="1312394028"/>
+      </p:ext>
+    </p:extLst>
+  </p:cSld>
+  <p:clrMapOvr>
+    <a:masterClrMapping/>
+  </p:clrMapOvr>
+</p:sld>
+</file>
+
+<file path=ppt/slides/slide2.xml><?xml version="1.0" encoding="utf-8"?>
+<p:sld xmlns:a="http://schemas.openxmlformats.org/drawingml/2006/main" xmlns:r="http://schemas.openxmlformats.org/officeDocument/2006/relationships" xmlns:p="http://schemas.openxmlformats.org/presentationml/2006/main">
+  <p:cSld>
+    <p:spTree>
+      <p:nvGrpSpPr>
+        <p:cNvPr id="1" name=""/>
+        <p:cNvGrpSpPr/>
+        <p:nvPr/>
+      </p:nvGrpSpPr>
+      <p:grpSpPr>
+        <a:xfrm>
+          <a:off x="0" y="0"/>
+          <a:ext cx="0" cy="0"/>
+          <a:chOff x="0" y="0"/>
+          <a:chExt cx="0" cy="0"/>
+        </a:xfrm>
+      </p:grpSpPr>
+      <p:sp>
+        <p:nvSpPr>
           <p:cNvPr id="2" name="Rectangle: Rounded Corners 1">
             <a:extLst>
               <a:ext uri="{FF2B5EF4-FFF2-40B4-BE49-F238E27FC236}">
@@ -2989,8 +3088,8 @@
         </p:nvSpPr>
         <p:spPr>
           <a:xfrm>
-            <a:off x="2402305" y="689811"/>
-            <a:ext cx="2053389" cy="336884"/>
+            <a:off x="5694354" y="1289310"/>
+            <a:ext cx="4867292" cy="798540"/>
           </a:xfrm>
           <a:prstGeom prst="roundRect">
             <a:avLst/>
@@ -3017,10 +3116,10 @@
           <a:p>
             <a:pPr algn="ctr"/>
             <a:r>
-              <a:rPr lang="en-US" sz="1400" dirty="0" err="1"/>
+              <a:rPr lang="en-US" sz="2400" dirty="0" err="1"/>
               <a:t>continousmapscript</a:t>
             </a:r>
-            <a:endParaRPr lang="en-US" sz="1400" dirty="0"/>
+            <a:endParaRPr lang="en-US" sz="2400" dirty="0"/>
           </a:p>
         </p:txBody>
       </p:sp>
@@ -3038,8 +3137,8 @@
         </p:nvSpPr>
         <p:spPr>
           <a:xfrm>
-            <a:off x="2402305" y="1420939"/>
-            <a:ext cx="2053389" cy="336884"/>
+            <a:off x="5694354" y="3022354"/>
+            <a:ext cx="4867292" cy="798540"/>
           </a:xfrm>
           <a:prstGeom prst="roundRect">
             <a:avLst/>
@@ -3066,10 +3165,10 @@
           <a:p>
             <a:pPr algn="ctr"/>
             <a:r>
-              <a:rPr lang="en-US" sz="1400" dirty="0" err="1"/>
+              <a:rPr lang="en-US" sz="2400" dirty="0" err="1"/>
               <a:t>MakeContiguousMap</a:t>
             </a:r>
-            <a:endParaRPr lang="en-US" sz="1400" dirty="0"/>
+            <a:endParaRPr lang="en-US" sz="2400" dirty="0"/>
           </a:p>
         </p:txBody>
       </p:sp>
@@ -3087,8 +3186,8 @@
         </p:nvSpPr>
         <p:spPr>
           <a:xfrm>
-            <a:off x="3459789" y="2185486"/>
-            <a:ext cx="730288" cy="336884"/>
+            <a:off x="8200981" y="4834614"/>
+            <a:ext cx="1731053" cy="798540"/>
           </a:xfrm>
           <a:prstGeom prst="roundRect">
             <a:avLst/>
@@ -3115,10 +3214,10 @@
           <a:p>
             <a:pPr algn="ctr"/>
             <a:r>
-              <a:rPr lang="en-US" sz="1200" dirty="0" err="1"/>
+              <a:rPr lang="en-US" sz="2400" dirty="0" err="1"/>
               <a:t>plot_patch</a:t>
             </a:r>
-            <a:endParaRPr lang="en-US" sz="1200" dirty="0"/>
+            <a:endParaRPr lang="en-US" sz="2400" dirty="0"/>
           </a:p>
         </p:txBody>
       </p:sp>
@@ -3136,8 +3235,8 @@
         </p:nvSpPr>
         <p:spPr>
           <a:xfrm>
-            <a:off x="2564814" y="2185486"/>
-            <a:ext cx="821354" cy="336884"/>
+            <a:off x="6079559" y="4834614"/>
+            <a:ext cx="1946913" cy="798540"/>
           </a:xfrm>
           <a:prstGeom prst="roundRect">
             <a:avLst/>
@@ -3164,10 +3263,10 @@
           <a:p>
             <a:pPr algn="ctr"/>
             <a:r>
-              <a:rPr lang="en-US" sz="1200" dirty="0" err="1"/>
+              <a:rPr lang="en-US" sz="2400" dirty="0" err="1"/>
               <a:t>make_patch</a:t>
             </a:r>
-            <a:endParaRPr lang="en-US" sz="1200" dirty="0"/>
+            <a:endParaRPr lang="en-US" sz="2400" dirty="0"/>
           </a:p>
         </p:txBody>
       </p:sp>
@@ -3185,8 +3284,8 @@
         </p:nvSpPr>
         <p:spPr>
           <a:xfrm>
-            <a:off x="4246000" y="2177650"/>
-            <a:ext cx="1604214" cy="336884"/>
+            <a:off x="10064593" y="4816040"/>
+            <a:ext cx="3802581" cy="798540"/>
           </a:xfrm>
           <a:prstGeom prst="roundRect">
             <a:avLst/>
@@ -3213,10 +3312,10 @@
           <a:p>
             <a:pPr algn="ctr"/>
             <a:r>
-              <a:rPr lang="en-US" sz="1200" dirty="0" err="1"/>
+              <a:rPr lang="en-US" sz="2400" dirty="0" err="1"/>
               <a:t>plot_contours_on_patch</a:t>
             </a:r>
-            <a:endParaRPr lang="en-US" sz="1200" dirty="0"/>
+            <a:endParaRPr lang="en-US" sz="2400" dirty="0"/>
           </a:p>
         </p:txBody>
       </p:sp>
@@ -3238,8 +3337,8 @@
         </p:nvCxnSpPr>
         <p:spPr>
           <a:xfrm rot="16200000" flipH="1">
-            <a:off x="3413135" y="1773687"/>
-            <a:ext cx="427663" cy="395933"/>
+            <a:off x="8090395" y="3858499"/>
+            <a:ext cx="1013720" cy="938508"/>
           </a:xfrm>
           <a:prstGeom prst="bentConnector3">
             <a:avLst/>
@@ -3275,8 +3374,8 @@
         </p:nvSpPr>
         <p:spPr>
           <a:xfrm>
-            <a:off x="1064372" y="2185486"/>
-            <a:ext cx="1435004" cy="336884"/>
+            <a:off x="2522956" y="4834614"/>
+            <a:ext cx="3401491" cy="798540"/>
           </a:xfrm>
           <a:prstGeom prst="roundRect">
             <a:avLst/>
@@ -3303,7 +3402,7 @@
           <a:p>
             <a:pPr algn="ctr"/>
             <a:r>
-              <a:rPr lang="en-US" sz="1200" dirty="0"/>
+              <a:rPr lang="en-US" sz="2400" dirty="0"/>
               <a:t>read_fits_map_L2_L3</a:t>
             </a:r>
           </a:p>
@@ -3323,8 +3422,8 @@
         </p:nvSpPr>
         <p:spPr>
           <a:xfrm>
-            <a:off x="-349194" y="2169070"/>
-            <a:ext cx="1356980" cy="336884"/>
+            <a:off x="-827719" y="4795702"/>
+            <a:ext cx="3216545" cy="798540"/>
           </a:xfrm>
           <a:prstGeom prst="roundRect">
             <a:avLst/>
@@ -3351,10 +3450,10 @@
           <a:p>
             <a:pPr algn="ctr"/>
             <a:r>
-              <a:rPr lang="en-US" sz="1200" dirty="0" err="1"/>
+              <a:rPr lang="en-US" sz="2400" dirty="0" err="1"/>
               <a:t>get_map_collection</a:t>
             </a:r>
-            <a:endParaRPr lang="en-US" sz="1200" dirty="0"/>
+            <a:endParaRPr lang="en-US" sz="2400" dirty="0"/>
           </a:p>
         </p:txBody>
       </p:sp>
@@ -3372,8 +3471,8 @@
         </p:nvSpPr>
         <p:spPr>
           <a:xfrm>
-            <a:off x="5915652" y="2172608"/>
-            <a:ext cx="942348" cy="336884"/>
+            <a:off x="14022286" y="4804088"/>
+            <a:ext cx="2233714" cy="798540"/>
           </a:xfrm>
           <a:prstGeom prst="roundRect">
             <a:avLst/>
@@ -3400,10 +3499,10 @@
           <a:p>
             <a:pPr algn="ctr"/>
             <a:r>
-              <a:rPr lang="en-US" sz="1200" dirty="0" err="1"/>
+              <a:rPr lang="en-US" sz="2400" dirty="0" err="1"/>
               <a:t>find_extrema</a:t>
             </a:r>
-            <a:endParaRPr lang="en-US" sz="1200" dirty="0"/>
+            <a:endParaRPr lang="en-US" sz="2400" dirty="0"/>
           </a:p>
         </p:txBody>
       </p:sp>
@@ -3425,8 +3524,8 @@
         </p:nvCxnSpPr>
         <p:spPr>
           <a:xfrm>
-            <a:off x="3429000" y="1026695"/>
-            <a:ext cx="0" cy="394244"/>
+            <a:off x="8128000" y="2087850"/>
+            <a:ext cx="0" cy="934504"/>
           </a:xfrm>
           <a:prstGeom prst="line">
             <a:avLst/>
@@ -3466,8 +3565,8 @@
         </p:nvCxnSpPr>
         <p:spPr>
           <a:xfrm rot="16200000" flipH="1">
-            <a:off x="4700521" y="486302"/>
-            <a:ext cx="414785" cy="2957826"/>
+            <a:off x="11141977" y="806919"/>
+            <a:ext cx="983194" cy="7011143"/>
           </a:xfrm>
           <a:prstGeom prst="bentConnector3">
             <a:avLst>
@@ -3509,8 +3608,8 @@
         </p:nvCxnSpPr>
         <p:spPr>
           <a:xfrm rot="5400000">
-            <a:off x="1673525" y="413594"/>
-            <a:ext cx="411247" cy="3099704"/>
+            <a:off x="3966875" y="634573"/>
+            <a:ext cx="974808" cy="7347447"/>
           </a:xfrm>
           <a:prstGeom prst="bentConnector3">
             <a:avLst>
@@ -3552,8 +3651,8 @@
         </p:nvCxnSpPr>
         <p:spPr>
           <a:xfrm rot="5400000">
-            <a:off x="2391606" y="1148091"/>
-            <a:ext cx="427663" cy="1647126"/>
+            <a:off x="5668993" y="2375603"/>
+            <a:ext cx="1013720" cy="3904299"/>
           </a:xfrm>
           <a:prstGeom prst="bentConnector3">
             <a:avLst>
@@ -3595,8 +3694,8 @@
         </p:nvCxnSpPr>
         <p:spPr>
           <a:xfrm rot="5400000">
-            <a:off x="2988415" y="1744900"/>
-            <a:ext cx="427663" cy="453509"/>
+            <a:off x="7083651" y="3790263"/>
+            <a:ext cx="1013720" cy="1074984"/>
           </a:xfrm>
           <a:prstGeom prst="bentConnector3">
             <a:avLst>
@@ -3638,8 +3737,8 @@
         </p:nvCxnSpPr>
         <p:spPr>
           <a:xfrm rot="16200000" flipH="1">
-            <a:off x="4028640" y="1158182"/>
-            <a:ext cx="419827" cy="1619107"/>
+            <a:off x="9549370" y="2399524"/>
+            <a:ext cx="995145" cy="3837883"/>
           </a:xfrm>
           <a:prstGeom prst="bentConnector3">
             <a:avLst>
@@ -3676,7 +3775,7 @@
 </p:sld>
 </file>
 
-<file path=ppt/slides/slide2.xml><?xml version="1.0" encoding="utf-8"?>
+<file path=ppt/slides/slide3.xml><?xml version="1.0" encoding="utf-8"?>
 <p:sld xmlns:a="http://schemas.openxmlformats.org/drawingml/2006/main" xmlns:r="http://schemas.openxmlformats.org/officeDocument/2006/relationships" xmlns:p="http://schemas.openxmlformats.org/presentationml/2006/main">
   <p:cSld>
     <p:spTree>
@@ -3713,8 +3812,8 @@
         </p:nvSpPr>
         <p:spPr>
           <a:xfrm>
-            <a:off x="2402305" y="1420939"/>
-            <a:ext cx="2053389" cy="336884"/>
+            <a:off x="5694354" y="4971470"/>
+            <a:ext cx="4867292" cy="798540"/>
           </a:xfrm>
           <a:prstGeom prst="roundRect">
             <a:avLst/>
@@ -3741,10 +3840,10 @@
           <a:p>
             <a:pPr algn="ctr"/>
             <a:r>
-              <a:rPr lang="en-US" sz="1400" dirty="0" err="1"/>
+              <a:rPr lang="en-US" sz="2400" dirty="0" err="1"/>
               <a:t>ROI_Script</a:t>
             </a:r>
-            <a:endParaRPr lang="en-US" sz="1400" dirty="0"/>
+            <a:endParaRPr lang="en-US" sz="2400" dirty="0"/>
           </a:p>
         </p:txBody>
       </p:sp>
@@ -3762,8 +3861,8 @@
         </p:nvSpPr>
         <p:spPr>
           <a:xfrm>
-            <a:off x="157284" y="2170532"/>
-            <a:ext cx="1373066" cy="336884"/>
+            <a:off x="372821" y="6748283"/>
+            <a:ext cx="3254675" cy="798540"/>
           </a:xfrm>
           <a:prstGeom prst="roundRect">
             <a:avLst/>
@@ -3790,7 +3889,7 @@
           <a:p>
             <a:pPr algn="ctr"/>
             <a:r>
-              <a:rPr lang="en-US" sz="1400" dirty="0"/>
+              <a:rPr lang="en-US" sz="2400" dirty="0"/>
               <a:t>L3_Jup_Map_Plot</a:t>
             </a:r>
           </a:p>
@@ -3810,8 +3909,8 @@
         </p:nvSpPr>
         <p:spPr>
           <a:xfrm>
-            <a:off x="1616498" y="2172985"/>
-            <a:ext cx="1636294" cy="336884"/>
+            <a:off x="3831699" y="6754098"/>
+            <a:ext cx="3878623" cy="798540"/>
           </a:xfrm>
           <a:prstGeom prst="roundRect">
             <a:avLst/>
@@ -3838,10 +3937,10 @@
           <a:p>
             <a:pPr algn="ctr"/>
             <a:r>
-              <a:rPr lang="en-US" sz="1400" dirty="0" err="1"/>
+              <a:rPr lang="en-US" sz="2400" dirty="0" err="1"/>
               <a:t>MakeContiguousMap</a:t>
             </a:r>
-            <a:endParaRPr lang="en-US" sz="1400" dirty="0"/>
+            <a:endParaRPr lang="en-US" sz="2400" dirty="0"/>
           </a:p>
         </p:txBody>
       </p:sp>
@@ -3863,8 +3962,8 @@
         </p:nvCxnSpPr>
         <p:spPr>
           <a:xfrm rot="5400000">
-            <a:off x="2724242" y="1468227"/>
-            <a:ext cx="415162" cy="994355"/>
+            <a:off x="6457462" y="5083561"/>
+            <a:ext cx="984088" cy="2356990"/>
           </a:xfrm>
           <a:prstGeom prst="bentConnector3">
             <a:avLst>
@@ -3906,8 +4005,8 @@
         </p:nvCxnSpPr>
         <p:spPr>
           <a:xfrm rot="5400000">
-            <a:off x="1930055" y="671586"/>
-            <a:ext cx="412709" cy="2585183"/>
+            <a:off x="4574946" y="3195227"/>
+            <a:ext cx="978273" cy="6127841"/>
           </a:xfrm>
           <a:prstGeom prst="bentConnector3">
             <a:avLst/>
@@ -3943,8 +4042,8 @@
         </p:nvSpPr>
         <p:spPr>
           <a:xfrm>
-            <a:off x="5067774" y="2172723"/>
-            <a:ext cx="1636294" cy="336884"/>
+            <a:off x="12012501" y="6753477"/>
+            <a:ext cx="3878623" cy="798540"/>
           </a:xfrm>
           <a:prstGeom prst="roundRect">
             <a:avLst/>
@@ -3971,10 +4070,10 @@
           <a:p>
             <a:pPr algn="ctr"/>
             <a:r>
-              <a:rPr lang="en-US" sz="1400" dirty="0" err="1"/>
+              <a:rPr lang="en-US" sz="2400" dirty="0" err="1"/>
               <a:t>NEDF_ROI_collections</a:t>
             </a:r>
-            <a:endParaRPr lang="en-US" sz="1400" dirty="0"/>
+            <a:endParaRPr lang="en-US" sz="2400" dirty="0"/>
           </a:p>
         </p:txBody>
       </p:sp>
@@ -3992,8 +4091,8 @@
         </p:nvSpPr>
         <p:spPr>
           <a:xfrm>
-            <a:off x="3342136" y="2175079"/>
-            <a:ext cx="1636294" cy="336884"/>
+            <a:off x="7922100" y="6759061"/>
+            <a:ext cx="3878623" cy="798540"/>
           </a:xfrm>
           <a:prstGeom prst="roundRect">
             <a:avLst/>
@@ -4020,10 +4119,10 @@
           <a:p>
             <a:pPr algn="ctr"/>
             <a:r>
-              <a:rPr lang="en-US" sz="1400" dirty="0" err="1"/>
+              <a:rPr lang="en-US" sz="2400" dirty="0" err="1"/>
               <a:t>get_map_collection</a:t>
             </a:r>
-            <a:endParaRPr lang="en-US" sz="1400" dirty="0"/>
+            <a:endParaRPr lang="en-US" sz="2400" dirty="0"/>
           </a:p>
         </p:txBody>
       </p:sp>
@@ -4045,8 +4144,8 @@
         </p:nvCxnSpPr>
         <p:spPr>
           <a:xfrm rot="16200000" flipH="1">
-            <a:off x="3586013" y="1600809"/>
-            <a:ext cx="417256" cy="731283"/>
+            <a:off x="8500179" y="5397830"/>
+            <a:ext cx="989051" cy="1733412"/>
           </a:xfrm>
           <a:prstGeom prst="bentConnector3">
             <a:avLst>
@@ -4088,8 +4187,8 @@
         </p:nvCxnSpPr>
         <p:spPr>
           <a:xfrm rot="16200000" flipH="1">
-            <a:off x="4450010" y="736812"/>
-            <a:ext cx="414900" cy="2456921"/>
+            <a:off x="10548172" y="3349837"/>
+            <a:ext cx="983467" cy="5823813"/>
           </a:xfrm>
           <a:prstGeom prst="bentConnector3">
             <a:avLst>
@@ -4126,7 +4225,7 @@
 </p:sld>
 </file>
 
-<file path=ppt/slides/slide3.xml><?xml version="1.0" encoding="utf-8"?>
+<file path=ppt/slides/slide4.xml><?xml version="1.0" encoding="utf-8"?>
 <p:sld xmlns:a="http://schemas.openxmlformats.org/drawingml/2006/main" xmlns:r="http://schemas.openxmlformats.org/officeDocument/2006/relationships" xmlns:p="http://schemas.openxmlformats.org/presentationml/2006/main">
   <p:cSld>
     <p:spTree>
@@ -4167,8 +4266,8 @@
         </p:nvCxnSpPr>
         <p:spPr>
           <a:xfrm rot="5400000">
-            <a:off x="1512598" y="1744248"/>
-            <a:ext cx="904648" cy="2430984"/>
+            <a:off x="3585417" y="925202"/>
+            <a:ext cx="2144351" cy="5762332"/>
           </a:xfrm>
           <a:prstGeom prst="bentConnector3">
             <a:avLst>
@@ -4213,8 +4312,8 @@
         </p:nvSpPr>
         <p:spPr>
           <a:xfrm>
-            <a:off x="2493881" y="2170532"/>
-            <a:ext cx="1373066" cy="336884"/>
+            <a:off x="5911422" y="1935652"/>
+            <a:ext cx="3254675" cy="798540"/>
           </a:xfrm>
           <a:prstGeom prst="roundRect">
             <a:avLst/>
@@ -4241,7 +4340,7 @@
           <a:p>
             <a:pPr algn="ctr"/>
             <a:r>
-              <a:rPr lang="en-US" sz="1400" dirty="0"/>
+              <a:rPr lang="en-US" sz="2400" dirty="0"/>
               <a:t>L3_Jup_Map_Plot</a:t>
             </a:r>
           </a:p>
@@ -4261,8 +4360,8 @@
         </p:nvSpPr>
         <p:spPr>
           <a:xfrm>
-            <a:off x="203998" y="3412064"/>
-            <a:ext cx="1090864" cy="336884"/>
+            <a:off x="483551" y="4878543"/>
+            <a:ext cx="2585752" cy="798540"/>
           </a:xfrm>
           <a:prstGeom prst="roundRect">
             <a:avLst/>
@@ -4289,10 +4388,10 @@
           <a:p>
             <a:pPr algn="ctr"/>
             <a:r>
-              <a:rPr lang="en-US" sz="1400" dirty="0" err="1"/>
+              <a:rPr lang="en-US" sz="2400" dirty="0" err="1"/>
               <a:t>make_patch</a:t>
             </a:r>
-            <a:endParaRPr lang="en-US" sz="1400" dirty="0"/>
+            <a:endParaRPr lang="en-US" sz="2400" dirty="0"/>
           </a:p>
         </p:txBody>
       </p:sp>
@@ -4310,8 +4409,8 @@
         </p:nvSpPr>
         <p:spPr>
           <a:xfrm>
-            <a:off x="1481805" y="3416175"/>
-            <a:ext cx="1636294" cy="336884"/>
+            <a:off x="3512427" y="4888288"/>
+            <a:ext cx="3878623" cy="798540"/>
           </a:xfrm>
           <a:prstGeom prst="roundRect">
             <a:avLst/>
@@ -4338,7 +4437,7 @@
           <a:p>
             <a:pPr algn="ctr"/>
             <a:r>
-              <a:rPr lang="en-US" sz="1400" dirty="0"/>
+              <a:rPr lang="en-US" sz="2400" dirty="0"/>
               <a:t>read_fits_map_L2_L3</a:t>
             </a:r>
           </a:p>
@@ -4358,8 +4457,8 @@
         </p:nvSpPr>
         <p:spPr>
           <a:xfrm>
-            <a:off x="3305042" y="3412065"/>
-            <a:ext cx="1636294" cy="336884"/>
+            <a:off x="7834174" y="4878545"/>
+            <a:ext cx="3878623" cy="798540"/>
           </a:xfrm>
           <a:prstGeom prst="roundRect">
             <a:avLst/>
@@ -4386,10 +4485,10 @@
           <a:p>
             <a:pPr algn="ctr"/>
             <a:r>
-              <a:rPr lang="en-US" sz="1400" dirty="0" err="1"/>
+              <a:rPr lang="en-US" sz="2400" dirty="0" err="1"/>
               <a:t>map_and_context</a:t>
             </a:r>
-            <a:endParaRPr lang="en-US" sz="1400" dirty="0"/>
+            <a:endParaRPr lang="en-US" sz="2400" dirty="0"/>
           </a:p>
         </p:txBody>
       </p:sp>
@@ -4407,8 +4506,8 @@
         </p:nvSpPr>
         <p:spPr>
           <a:xfrm>
-            <a:off x="5065964" y="3412065"/>
-            <a:ext cx="1636294" cy="336884"/>
+            <a:off x="12008211" y="4878545"/>
+            <a:ext cx="3878623" cy="798540"/>
           </a:xfrm>
           <a:prstGeom prst="roundRect">
             <a:avLst/>
@@ -4435,10 +4534,10 @@
           <a:p>
             <a:pPr algn="ctr"/>
             <a:r>
-              <a:rPr lang="en-US" sz="1400" dirty="0" err="1"/>
+              <a:rPr lang="en-US" sz="2400" dirty="0" err="1"/>
               <a:t>map_and_scatter</a:t>
             </a:r>
-            <a:endParaRPr lang="en-US" sz="1400" dirty="0"/>
+            <a:endParaRPr lang="en-US" sz="2400" dirty="0"/>
           </a:p>
         </p:txBody>
       </p:sp>
@@ -4460,8 +4559,8 @@
         </p:nvCxnSpPr>
         <p:spPr>
           <a:xfrm rot="16200000" flipH="1">
-            <a:off x="3199477" y="2488352"/>
-            <a:ext cx="904649" cy="942775"/>
+            <a:off x="7583947" y="2689005"/>
+            <a:ext cx="2144353" cy="2234726"/>
           </a:xfrm>
           <a:prstGeom prst="bentConnector3">
             <a:avLst/>
@@ -4508,8 +4607,8 @@
         </p:nvCxnSpPr>
         <p:spPr>
           <a:xfrm rot="16200000" flipH="1">
-            <a:off x="4079938" y="1607891"/>
-            <a:ext cx="904649" cy="2703697"/>
+            <a:off x="9670965" y="601986"/>
+            <a:ext cx="2144353" cy="6408763"/>
           </a:xfrm>
           <a:prstGeom prst="bentConnector3">
             <a:avLst>
@@ -4558,8 +4657,8 @@
         </p:nvCxnSpPr>
         <p:spPr>
           <a:xfrm rot="5400000">
-            <a:off x="2285804" y="2521564"/>
-            <a:ext cx="908759" cy="880462"/>
+            <a:off x="5418203" y="2767728"/>
+            <a:ext cx="2154095" cy="2087021"/>
           </a:xfrm>
           <a:prstGeom prst="bentConnector3">
             <a:avLst>
@@ -4603,7 +4702,7 @@
 </p:sld>
 </file>
 
-<file path=ppt/slides/slide4.xml><?xml version="1.0" encoding="utf-8"?>
+<file path=ppt/slides/slide5.xml><?xml version="1.0" encoding="utf-8"?>
 <p:sld xmlns:a="http://schemas.openxmlformats.org/drawingml/2006/main" xmlns:r="http://schemas.openxmlformats.org/officeDocument/2006/relationships" xmlns:p="http://schemas.openxmlformats.org/presentationml/2006/main">
   <p:cSld>
     <p:spTree>
@@ -4640,8 +4739,8 @@
         </p:nvSpPr>
         <p:spPr>
           <a:xfrm>
-            <a:off x="253966" y="4603567"/>
-            <a:ext cx="1090864" cy="336884"/>
+            <a:off x="601993" y="7695755"/>
+            <a:ext cx="2585752" cy="798540"/>
           </a:xfrm>
           <a:prstGeom prst="roundRect">
             <a:avLst/>
@@ -4668,10 +4767,10 @@
           <a:p>
             <a:pPr algn="ctr"/>
             <a:r>
-              <a:rPr lang="en-US" sz="1200" dirty="0" err="1"/>
+              <a:rPr lang="en-US" sz="2400" dirty="0" err="1"/>
               <a:t>make_patch</a:t>
             </a:r>
-            <a:endParaRPr lang="en-US" sz="1200" dirty="0"/>
+            <a:endParaRPr lang="en-US" sz="2400" dirty="0"/>
           </a:p>
         </p:txBody>
       </p:sp>
@@ -4689,8 +4788,8 @@
         </p:nvSpPr>
         <p:spPr>
           <a:xfrm>
-            <a:off x="2772041" y="4603567"/>
-            <a:ext cx="2078728" cy="336884"/>
+            <a:off x="6570764" y="7695755"/>
+            <a:ext cx="4927355" cy="798540"/>
           </a:xfrm>
           <a:prstGeom prst="roundRect">
             <a:avLst/>
@@ -4717,10 +4816,10 @@
           <a:p>
             <a:pPr algn="ctr"/>
             <a:r>
-              <a:rPr lang="en-US" sz="1200" dirty="0" err="1"/>
+              <a:rPr lang="en-US" sz="2400" dirty="0" err="1"/>
               <a:t>plot_contours_on_patch</a:t>
             </a:r>
-            <a:endParaRPr lang="en-US" sz="1200" dirty="0"/>
+            <a:endParaRPr lang="en-US" sz="2400" dirty="0"/>
           </a:p>
         </p:txBody>
       </p:sp>
@@ -4738,8 +4837,8 @@
         </p:nvSpPr>
         <p:spPr>
           <a:xfrm>
-            <a:off x="1706075" y="4603567"/>
-            <a:ext cx="913802" cy="336884"/>
+            <a:off x="4044030" y="7695755"/>
+            <a:ext cx="2166049" cy="798540"/>
           </a:xfrm>
           <a:prstGeom prst="roundRect">
             <a:avLst/>
@@ -4766,10 +4865,10 @@
           <a:p>
             <a:pPr algn="ctr"/>
             <a:r>
-              <a:rPr lang="en-US" sz="1200" dirty="0" err="1"/>
+              <a:rPr lang="en-US" sz="2400" dirty="0" err="1"/>
               <a:t>plot_patch</a:t>
             </a:r>
-            <a:endParaRPr lang="en-US" sz="1200" dirty="0"/>
+            <a:endParaRPr lang="en-US" sz="2400" dirty="0"/>
           </a:p>
         </p:txBody>
       </p:sp>
@@ -4787,8 +4886,8 @@
         </p:nvSpPr>
         <p:spPr>
           <a:xfrm>
-            <a:off x="5097528" y="4603567"/>
-            <a:ext cx="1407732" cy="336884"/>
+            <a:off x="12083029" y="7695755"/>
+            <a:ext cx="3336846" cy="798540"/>
           </a:xfrm>
           <a:prstGeom prst="roundRect">
             <a:avLst/>
@@ -4815,10 +4914,10 @@
           <a:p>
             <a:pPr algn="ctr"/>
             <a:r>
-              <a:rPr lang="en-US" sz="1200" dirty="0" err="1"/>
+              <a:rPr lang="en-US" sz="2400" dirty="0" err="1"/>
               <a:t>make_patch_RGB</a:t>
             </a:r>
-            <a:endParaRPr lang="en-US" sz="1200" dirty="0"/>
+            <a:endParaRPr lang="en-US" sz="2400" dirty="0"/>
           </a:p>
         </p:txBody>
       </p:sp>
@@ -4836,8 +4935,8 @@
         </p:nvSpPr>
         <p:spPr>
           <a:xfrm>
-            <a:off x="2351205" y="3412065"/>
-            <a:ext cx="1636294" cy="336884"/>
+            <a:off x="5573227" y="4871454"/>
+            <a:ext cx="3878623" cy="798540"/>
           </a:xfrm>
           <a:prstGeom prst="roundRect">
             <a:avLst/>
@@ -4864,10 +4963,10 @@
           <a:p>
             <a:pPr algn="ctr"/>
             <a:r>
-              <a:rPr lang="en-US" sz="1400" dirty="0" err="1"/>
+              <a:rPr lang="en-US" sz="2400" dirty="0" err="1"/>
               <a:t>map_and_context</a:t>
             </a:r>
-            <a:endParaRPr lang="en-US" sz="1400" dirty="0"/>
+            <a:endParaRPr lang="en-US" sz="2400" dirty="0"/>
           </a:p>
         </p:txBody>
       </p:sp>
@@ -4889,8 +4988,8 @@
         </p:nvCxnSpPr>
         <p:spPr>
           <a:xfrm rot="16200000" flipH="1">
-            <a:off x="4058064" y="2860237"/>
-            <a:ext cx="854618" cy="2632042"/>
+            <a:off x="9619115" y="3563418"/>
+            <a:ext cx="2025761" cy="6238914"/>
           </a:xfrm>
           <a:prstGeom prst="bentConnector3">
             <a:avLst/>
@@ -4937,8 +5036,8 @@
         </p:nvCxnSpPr>
         <p:spPr>
           <a:xfrm rot="5400000">
-            <a:off x="2238855" y="3673070"/>
-            <a:ext cx="854618" cy="1006376"/>
+            <a:off x="5306916" y="5490133"/>
+            <a:ext cx="2025761" cy="2385484"/>
           </a:xfrm>
           <a:prstGeom prst="bentConnector3">
             <a:avLst/>
@@ -4985,8 +5084,8 @@
         </p:nvCxnSpPr>
         <p:spPr>
           <a:xfrm rot="16200000" flipH="1">
-            <a:off x="3063069" y="3855231"/>
-            <a:ext cx="854618" cy="642053"/>
+            <a:off x="7260608" y="5921923"/>
+            <a:ext cx="2025761" cy="1521903"/>
           </a:xfrm>
           <a:prstGeom prst="bentConnector3">
             <a:avLst>
@@ -5031,8 +5130,8 @@
         </p:nvSpPr>
         <p:spPr>
           <a:xfrm>
-            <a:off x="1056606" y="561608"/>
-            <a:ext cx="4744788" cy="2862322"/>
+            <a:off x="2504548" y="1054586"/>
+            <a:ext cx="11246905" cy="3539430"/>
           </a:xfrm>
           <a:prstGeom prst="rect">
             <a:avLst/>
@@ -5045,12 +5144,12 @@
           </a:bodyPr>
           <a:lstStyle/>
           <a:p>
-            <a:pPr marL="342900" indent="-342900">
+            <a:pPr marL="812810" indent="-812810">
               <a:buFont typeface="Wingdings" panose="05000000000000000000" pitchFamily="2" charset="2"/>
               <a:buChar char="ü"/>
             </a:pPr>
             <a:r>
-              <a:rPr lang="en-US" dirty="0">
+              <a:rPr lang="en-US" sz="2800" dirty="0">
                 <a:solidFill>
                   <a:srgbClr val="C00000"/>
                 </a:solidFill>
@@ -5058,7 +5157,7 @@
               <a:t>Can we make </a:t>
             </a:r>
             <a:r>
-              <a:rPr lang="en-US" dirty="0" err="1">
+              <a:rPr lang="en-US" sz="2800" dirty="0" err="1">
                 <a:solidFill>
                   <a:srgbClr val="C00000"/>
                 </a:solidFill>
@@ -5066,7 +5165,7 @@
               <a:t>make_patch</a:t>
             </a:r>
             <a:r>
-              <a:rPr lang="en-US" dirty="0">
+              <a:rPr lang="en-US" sz="2800" dirty="0">
                 <a:solidFill>
                   <a:srgbClr val="C00000"/>
                 </a:solidFill>
@@ -5074,7 +5173,7 @@
               <a:t>, </a:t>
             </a:r>
             <a:r>
-              <a:rPr lang="en-US" dirty="0" err="1">
+              <a:rPr lang="en-US" sz="2800" dirty="0" err="1">
                 <a:solidFill>
                   <a:srgbClr val="C00000"/>
                 </a:solidFill>
@@ -5082,7 +5181,7 @@
               <a:t>plot_patch</a:t>
             </a:r>
             <a:r>
-              <a:rPr lang="en-US" dirty="0">
+              <a:rPr lang="en-US" sz="2800" dirty="0">
                 <a:solidFill>
                   <a:srgbClr val="C00000"/>
                 </a:solidFill>
@@ -5091,12 +5190,12 @@
             </a:r>
           </a:p>
           <a:p>
-            <a:pPr marL="342900" indent="-342900">
+            <a:pPr marL="812810" indent="-812810">
               <a:buFont typeface="Wingdings" panose="05000000000000000000" pitchFamily="2" charset="2"/>
               <a:buChar char="ü"/>
             </a:pPr>
             <a:r>
-              <a:rPr lang="en-US" dirty="0">
+              <a:rPr lang="en-US" sz="2800" dirty="0">
                 <a:solidFill>
                   <a:srgbClr val="C00000"/>
                 </a:solidFill>
@@ -5105,12 +5204,12 @@
             </a:r>
           </a:p>
           <a:p>
-            <a:pPr marL="342900" indent="-342900">
+            <a:pPr marL="812810" indent="-812810">
               <a:buFont typeface="Arial" panose="020B0604020202020204" pitchFamily="34" charset="0"/>
               <a:buChar char="•"/>
             </a:pPr>
             <a:r>
-              <a:rPr lang="en-US" dirty="0">
+              <a:rPr lang="en-US" sz="2800" dirty="0">
                 <a:solidFill>
                   <a:srgbClr val="C00000"/>
                 </a:solidFill>
@@ -5118,7 +5217,7 @@
               <a:t>Can we provide an alternative that over plots in red and black only the most extreme contours of fNH3 and </a:t>
             </a:r>
             <a:r>
-              <a:rPr lang="en-US" dirty="0" err="1">
+              <a:rPr lang="en-US" sz="2800" dirty="0" err="1">
                 <a:solidFill>
                   <a:srgbClr val="C00000"/>
                 </a:solidFill>
@@ -5126,7 +5225,7 @@
               <a:t>PCld</a:t>
             </a:r>
             <a:r>
-              <a:rPr lang="en-US" dirty="0">
+              <a:rPr lang="en-US" sz="2800" dirty="0">
                 <a:solidFill>
                   <a:srgbClr val="C00000"/>
                 </a:solidFill>
@@ -5154,8 +5253,8 @@
         </p:nvCxnSpPr>
         <p:spPr>
           <a:xfrm rot="5400000">
-            <a:off x="1557066" y="2991281"/>
-            <a:ext cx="854618" cy="2369954"/>
+            <a:off x="3690823" y="3874040"/>
+            <a:ext cx="2025761" cy="5617669"/>
           </a:xfrm>
           <a:prstGeom prst="bentConnector3">
             <a:avLst/>
@@ -5197,7 +5296,7 @@
 </p:sld>
 </file>
 
-<file path=ppt/slides/slide5.xml><?xml version="1.0" encoding="utf-8"?>
+<file path=ppt/slides/slide6.xml><?xml version="1.0" encoding="utf-8"?>
 <p:sld xmlns:a="http://schemas.openxmlformats.org/drawingml/2006/main" xmlns:r="http://schemas.openxmlformats.org/officeDocument/2006/relationships" xmlns:p="http://schemas.openxmlformats.org/presentationml/2006/main">
   <p:cSld>
     <p:spTree>
@@ -5234,8 +5333,8 @@
         </p:nvSpPr>
         <p:spPr>
           <a:xfrm>
-            <a:off x="483754" y="4092506"/>
-            <a:ext cx="845108" cy="336884"/>
+            <a:off x="1146676" y="6814975"/>
+            <a:ext cx="2003219" cy="798540"/>
           </a:xfrm>
           <a:prstGeom prst="roundRect">
             <a:avLst/>
@@ -5262,10 +5361,10 @@
           <a:p>
             <a:pPr algn="ctr"/>
             <a:r>
-              <a:rPr lang="en-US" sz="1200" dirty="0" err="1"/>
+              <a:rPr lang="en-US" sz="2400" dirty="0" err="1"/>
               <a:t>make_patch</a:t>
             </a:r>
-            <a:endParaRPr lang="en-US" sz="1200" dirty="0"/>
+            <a:endParaRPr lang="en-US" sz="2400" dirty="0"/>
           </a:p>
         </p:txBody>
       </p:sp>
@@ -5283,8 +5382,8 @@
         </p:nvSpPr>
         <p:spPr>
           <a:xfrm>
-            <a:off x="2324898" y="4092506"/>
-            <a:ext cx="1783406" cy="336884"/>
+            <a:off x="5510869" y="6814975"/>
+            <a:ext cx="4227333" cy="798540"/>
           </a:xfrm>
           <a:prstGeom prst="roundRect">
             <a:avLst/>
@@ -5311,10 +5410,10 @@
           <a:p>
             <a:pPr algn="ctr"/>
             <a:r>
-              <a:rPr lang="en-US" sz="1200" dirty="0" err="1"/>
+              <a:rPr lang="en-US" sz="2400" dirty="0" err="1"/>
               <a:t>plot_contours_on_patch</a:t>
             </a:r>
-            <a:endParaRPr lang="en-US" sz="1200" dirty="0"/>
+            <a:endParaRPr lang="en-US" sz="2400" dirty="0"/>
           </a:p>
         </p:txBody>
       </p:sp>
@@ -5332,8 +5431,8 @@
         </p:nvSpPr>
         <p:spPr>
           <a:xfrm>
-            <a:off x="1454153" y="4092506"/>
-            <a:ext cx="745454" cy="336884"/>
+            <a:off x="3446881" y="6814975"/>
+            <a:ext cx="1767002" cy="798540"/>
           </a:xfrm>
           <a:prstGeom prst="roundRect">
             <a:avLst/>
@@ -5360,10 +5459,10 @@
           <a:p>
             <a:pPr algn="ctr"/>
             <a:r>
-              <a:rPr lang="en-US" sz="1200" dirty="0" err="1"/>
+              <a:rPr lang="en-US" sz="2400" dirty="0" err="1"/>
               <a:t>plot_patch</a:t>
             </a:r>
-            <a:endParaRPr lang="en-US" sz="1200" dirty="0"/>
+            <a:endParaRPr lang="en-US" sz="2400" dirty="0"/>
           </a:p>
         </p:txBody>
       </p:sp>
@@ -5381,8 +5480,8 @@
         </p:nvSpPr>
         <p:spPr>
           <a:xfrm>
-            <a:off x="2749696" y="3146251"/>
-            <a:ext cx="1358608" cy="336884"/>
+            <a:off x="6517798" y="4572000"/>
+            <a:ext cx="3220404" cy="798540"/>
           </a:xfrm>
           <a:prstGeom prst="roundRect">
             <a:avLst/>
@@ -5409,10 +5508,10 @@
           <a:p>
             <a:pPr algn="ctr"/>
             <a:r>
-              <a:rPr lang="en-US" sz="1400" dirty="0" err="1"/>
+              <a:rPr lang="en-US" sz="2400" dirty="0" err="1"/>
               <a:t>map_and_scatter</a:t>
             </a:r>
-            <a:endParaRPr lang="en-US" sz="1400" dirty="0"/>
+            <a:endParaRPr lang="en-US" sz="2400" dirty="0"/>
           </a:p>
         </p:txBody>
       </p:sp>
@@ -5434,8 +5533,8 @@
         </p:nvCxnSpPr>
         <p:spPr>
           <a:xfrm rot="5400000">
-            <a:off x="3018116" y="3681621"/>
-            <a:ext cx="609371" cy="212399"/>
+            <a:off x="7154054" y="5841026"/>
+            <a:ext cx="1444435" cy="503464"/>
           </a:xfrm>
           <a:prstGeom prst="bentConnector3">
             <a:avLst>
@@ -5480,8 +5579,8 @@
         </p:nvSpPr>
         <p:spPr>
           <a:xfrm>
-            <a:off x="4239675" y="4092506"/>
-            <a:ext cx="1157156" cy="336884"/>
+            <a:off x="10049600" y="6814975"/>
+            <a:ext cx="2742888" cy="798540"/>
           </a:xfrm>
           <a:prstGeom prst="roundRect">
             <a:avLst/>
@@ -5508,10 +5607,10 @@
           <a:p>
             <a:pPr algn="ctr"/>
             <a:r>
-              <a:rPr lang="en-US" sz="1200" dirty="0" err="1"/>
+              <a:rPr lang="en-US" sz="2400" dirty="0" err="1"/>
               <a:t>plot_roi_scatter</a:t>
             </a:r>
-            <a:endParaRPr lang="en-US" sz="1200" dirty="0"/>
+            <a:endParaRPr lang="en-US" sz="2400" dirty="0"/>
           </a:p>
         </p:txBody>
       </p:sp>
@@ -5529,8 +5628,8 @@
         </p:nvSpPr>
         <p:spPr>
           <a:xfrm>
-            <a:off x="5492104" y="4092506"/>
-            <a:ext cx="1131256" cy="336884"/>
+            <a:off x="13018320" y="6814975"/>
+            <a:ext cx="2681496" cy="798540"/>
           </a:xfrm>
           <a:prstGeom prst="roundRect">
             <a:avLst/>
@@ -5557,10 +5656,10 @@
           <a:p>
             <a:pPr algn="ctr"/>
             <a:r>
-              <a:rPr lang="en-US" sz="1200" dirty="0" err="1"/>
+              <a:rPr lang="en-US" sz="2400" dirty="0" err="1"/>
               <a:t>plot_map_scatter</a:t>
             </a:r>
-            <a:endParaRPr lang="en-US" sz="1200" dirty="0"/>
+            <a:endParaRPr lang="en-US" sz="2400" dirty="0"/>
           </a:p>
         </p:txBody>
       </p:sp>
@@ -5582,8 +5681,8 @@
         </p:nvCxnSpPr>
         <p:spPr>
           <a:xfrm rot="16200000" flipH="1">
-            <a:off x="3818941" y="3093193"/>
-            <a:ext cx="609371" cy="1389253"/>
+            <a:off x="9052306" y="4446234"/>
+            <a:ext cx="1444435" cy="3293044"/>
           </a:xfrm>
           <a:prstGeom prst="bentConnector3">
             <a:avLst>
@@ -5632,8 +5731,8 @@
         </p:nvCxnSpPr>
         <p:spPr>
           <a:xfrm rot="16200000" flipH="1">
-            <a:off x="4438681" y="2473454"/>
-            <a:ext cx="609371" cy="2628732"/>
+            <a:off x="10521319" y="2977222"/>
+            <a:ext cx="1444435" cy="6231068"/>
           </a:xfrm>
           <a:prstGeom prst="bentConnector3">
             <a:avLst>
@@ -5682,8 +5781,8 @@
         </p:nvCxnSpPr>
         <p:spPr>
           <a:xfrm rot="5400000">
-            <a:off x="2323255" y="2986760"/>
-            <a:ext cx="609371" cy="1602120"/>
+            <a:off x="5506976" y="4193947"/>
+            <a:ext cx="1444435" cy="3797618"/>
           </a:xfrm>
           <a:prstGeom prst="bentConnector3">
             <a:avLst>
@@ -5728,8 +5827,8 @@
         </p:nvSpPr>
         <p:spPr>
           <a:xfrm>
-            <a:off x="1056606" y="561608"/>
-            <a:ext cx="4744788" cy="2308324"/>
+            <a:off x="2504548" y="1064188"/>
+            <a:ext cx="11246905" cy="3108543"/>
           </a:xfrm>
           <a:prstGeom prst="rect">
             <a:avLst/>
@@ -5742,12 +5841,12 @@
           </a:bodyPr>
           <a:lstStyle/>
           <a:p>
-            <a:pPr marL="342900" indent="-342900">
+            <a:pPr marL="812810" indent="-812810">
               <a:buFont typeface="Wingdings" panose="05000000000000000000" pitchFamily="2" charset="2"/>
               <a:buChar char="ü"/>
             </a:pPr>
             <a:r>
-              <a:rPr lang="en-US" dirty="0">
+              <a:rPr lang="en-US" sz="2800" dirty="0">
                 <a:solidFill>
                   <a:srgbClr val="C00000"/>
                 </a:solidFill>
@@ -5755,7 +5854,7 @@
               <a:t>Can we make </a:t>
             </a:r>
             <a:r>
-              <a:rPr lang="en-US" dirty="0" err="1">
+              <a:rPr lang="en-US" sz="2800" dirty="0" err="1">
                 <a:solidFill>
                   <a:srgbClr val="C00000"/>
                 </a:solidFill>
@@ -5763,7 +5862,7 @@
               <a:t>make_patch</a:t>
             </a:r>
             <a:r>
-              <a:rPr lang="en-US" dirty="0">
+              <a:rPr lang="en-US" sz="2800" dirty="0">
                 <a:solidFill>
                   <a:srgbClr val="C00000"/>
                 </a:solidFill>
@@ -5771,7 +5870,7 @@
               <a:t>, </a:t>
             </a:r>
             <a:r>
-              <a:rPr lang="en-US" dirty="0" err="1">
+              <a:rPr lang="en-US" sz="2800" dirty="0" err="1">
                 <a:solidFill>
                   <a:srgbClr val="C00000"/>
                 </a:solidFill>
@@ -5779,7 +5878,7 @@
               <a:t>plot_patch</a:t>
             </a:r>
             <a:r>
-              <a:rPr lang="en-US" dirty="0">
+              <a:rPr lang="en-US" sz="2800" dirty="0">
                 <a:solidFill>
                   <a:srgbClr val="C00000"/>
                 </a:solidFill>
@@ -5788,12 +5887,12 @@
             </a:r>
           </a:p>
           <a:p>
-            <a:pPr marL="342900" indent="-342900">
+            <a:pPr marL="812810" indent="-812810">
               <a:buFont typeface="Wingdings" panose="05000000000000000000" pitchFamily="2" charset="2"/>
               <a:buChar char="ü"/>
             </a:pPr>
             <a:r>
-              <a:rPr lang="en-US" dirty="0">
+              <a:rPr lang="en-US" sz="2800" dirty="0">
                 <a:solidFill>
                   <a:srgbClr val="C00000"/>
                 </a:solidFill>
@@ -5802,12 +5901,12 @@
             </a:r>
           </a:p>
           <a:p>
-            <a:pPr marL="342900" indent="-342900">
+            <a:pPr marL="812810" indent="-812810">
               <a:buFont typeface="Arial" panose="020B0604020202020204" pitchFamily="34" charset="0"/>
               <a:buChar char="•"/>
             </a:pPr>
             <a:r>
-              <a:rPr lang="en-US" dirty="0">
+              <a:rPr lang="en-US" sz="2800" dirty="0">
                 <a:solidFill>
                   <a:srgbClr val="C00000"/>
                 </a:solidFill>
@@ -5815,7 +5914,7 @@
               <a:t>Can we provide an alternative that over plots in red and black only the most extreme contours of fNH3 and </a:t>
             </a:r>
             <a:r>
-              <a:rPr lang="en-US" dirty="0" err="1">
+              <a:rPr lang="en-US" sz="2800" dirty="0" err="1">
                 <a:solidFill>
                   <a:srgbClr val="C00000"/>
                 </a:solidFill>
@@ -5823,7 +5922,7 @@
               <a:t>PCld</a:t>
             </a:r>
             <a:r>
-              <a:rPr lang="en-US" dirty="0">
+              <a:rPr lang="en-US" sz="2800" dirty="0">
                 <a:solidFill>
                   <a:srgbClr val="C00000"/>
                 </a:solidFill>
@@ -5851,8 +5950,8 @@
         </p:nvCxnSpPr>
         <p:spPr>
           <a:xfrm rot="5400000">
-            <a:off x="1862969" y="2526474"/>
-            <a:ext cx="609371" cy="2522692"/>
+            <a:off x="4415928" y="3102899"/>
+            <a:ext cx="1444435" cy="5979714"/>
           </a:xfrm>
           <a:prstGeom prst="bentConnector3">
             <a:avLst>

</xml_diff>

<commit_message>
Rearchitected parts of NEZ features and outside data sources
Changes locations and organization of HST data and made NEZ feature codes work with that. Next up is to reorganize other outside data like 889nm and 5-micron data
</commit_message>
<xml_diff>
--- a/Maps/Map Calling Trees.pptx
+++ b/Maps/Map Calling Trees.pptx
@@ -248,7 +248,7 @@
           <a:p>
             <a:fld id="{4728A198-E1B1-4E07-BA63-B848E5929EE6}" type="datetimeFigureOut">
               <a:rPr lang="en-US" smtClean="0"/>
-              <a:t>11/20/2025</a:t>
+              <a:t>12/26/2025</a:t>
             </a:fld>
             <a:endParaRPr lang="en-US"/>
           </a:p>
@@ -418,7 +418,7 @@
           <a:p>
             <a:fld id="{4728A198-E1B1-4E07-BA63-B848E5929EE6}" type="datetimeFigureOut">
               <a:rPr lang="en-US" smtClean="0"/>
-              <a:t>11/20/2025</a:t>
+              <a:t>12/26/2025</a:t>
             </a:fld>
             <a:endParaRPr lang="en-US"/>
           </a:p>
@@ -598,7 +598,7 @@
           <a:p>
             <a:fld id="{4728A198-E1B1-4E07-BA63-B848E5929EE6}" type="datetimeFigureOut">
               <a:rPr lang="en-US" smtClean="0"/>
-              <a:t>11/20/2025</a:t>
+              <a:t>12/26/2025</a:t>
             </a:fld>
             <a:endParaRPr lang="en-US"/>
           </a:p>
@@ -768,7 +768,7 @@
           <a:p>
             <a:fld id="{4728A198-E1B1-4E07-BA63-B848E5929EE6}" type="datetimeFigureOut">
               <a:rPr lang="en-US" smtClean="0"/>
-              <a:t>11/20/2025</a:t>
+              <a:t>12/26/2025</a:t>
             </a:fld>
             <a:endParaRPr lang="en-US"/>
           </a:p>
@@ -1014,7 +1014,7 @@
           <a:p>
             <a:fld id="{4728A198-E1B1-4E07-BA63-B848E5929EE6}" type="datetimeFigureOut">
               <a:rPr lang="en-US" smtClean="0"/>
-              <a:t>11/20/2025</a:t>
+              <a:t>12/26/2025</a:t>
             </a:fld>
             <a:endParaRPr lang="en-US"/>
           </a:p>
@@ -1246,7 +1246,7 @@
           <a:p>
             <a:fld id="{4728A198-E1B1-4E07-BA63-B848E5929EE6}" type="datetimeFigureOut">
               <a:rPr lang="en-US" smtClean="0"/>
-              <a:t>11/20/2025</a:t>
+              <a:t>12/26/2025</a:t>
             </a:fld>
             <a:endParaRPr lang="en-US"/>
           </a:p>
@@ -1613,7 +1613,7 @@
           <a:p>
             <a:fld id="{4728A198-E1B1-4E07-BA63-B848E5929EE6}" type="datetimeFigureOut">
               <a:rPr lang="en-US" smtClean="0"/>
-              <a:t>11/20/2025</a:t>
+              <a:t>12/26/2025</a:t>
             </a:fld>
             <a:endParaRPr lang="en-US"/>
           </a:p>
@@ -1731,7 +1731,7 @@
           <a:p>
             <a:fld id="{4728A198-E1B1-4E07-BA63-B848E5929EE6}" type="datetimeFigureOut">
               <a:rPr lang="en-US" smtClean="0"/>
-              <a:t>11/20/2025</a:t>
+              <a:t>12/26/2025</a:t>
             </a:fld>
             <a:endParaRPr lang="en-US"/>
           </a:p>
@@ -1826,7 +1826,7 @@
           <a:p>
             <a:fld id="{4728A198-E1B1-4E07-BA63-B848E5929EE6}" type="datetimeFigureOut">
               <a:rPr lang="en-US" smtClean="0"/>
-              <a:t>11/20/2025</a:t>
+              <a:t>12/26/2025</a:t>
             </a:fld>
             <a:endParaRPr lang="en-US"/>
           </a:p>
@@ -2103,7 +2103,7 @@
           <a:p>
             <a:fld id="{4728A198-E1B1-4E07-BA63-B848E5929EE6}" type="datetimeFigureOut">
               <a:rPr lang="en-US" smtClean="0"/>
-              <a:t>11/20/2025</a:t>
+              <a:t>12/26/2025</a:t>
             </a:fld>
             <a:endParaRPr lang="en-US"/>
           </a:p>
@@ -2360,7 +2360,7 @@
           <a:p>
             <a:fld id="{4728A198-E1B1-4E07-BA63-B848E5929EE6}" type="datetimeFigureOut">
               <a:rPr lang="en-US" smtClean="0"/>
-              <a:t>11/20/2025</a:t>
+              <a:t>12/26/2025</a:t>
             </a:fld>
             <a:endParaRPr lang="en-US"/>
           </a:p>
@@ -2573,7 +2573,7 @@
           <a:p>
             <a:fld id="{4728A198-E1B1-4E07-BA63-B848E5929EE6}" type="datetimeFigureOut">
               <a:rPr lang="en-US" smtClean="0"/>
-              <a:t>11/20/2025</a:t>
+              <a:t>12/26/2025</a:t>
             </a:fld>
             <a:endParaRPr lang="en-US"/>
           </a:p>

</xml_diff>